<commit_message>
[V0.4][Documentation] Update model component class diagram
</commit_message>
<xml_diff>
--- a/docs/diagrams/ModelComponentClassDiagram.pptx
+++ b/docs/diagrams/ModelComponentClassDiagram.pptx
@@ -109,7 +109,7 @@
   </p:defaultTextStyle>
   <p:extLst>
     <p:ext uri="{EFAFB233-063F-42B5-8137-9DF3F51BA10A}">
-      <p15:sldGuideLst xmlns:p15="http://schemas.microsoft.com/office/powerpoint/2012/main" xmlns="">
+      <p15:sldGuideLst xmlns:p15="http://schemas.microsoft.com/office/powerpoint/2012/main">
         <p15:guide id="1" orient="horz" pos="1488">
           <p15:clr>
             <a:srgbClr val="A4A3A4"/>
@@ -209,7 +209,7 @@
             <a:fld id="{F5CC4B3F-88C1-4FFA-B1B6-F41C21DC6924}" type="datetimeFigureOut">
               <a:rPr lang="en-US" smtClean="0"/>
               <a:pPr/>
-              <a:t>3/27/2017</a:t>
+              <a:t>3/27/17</a:t>
             </a:fld>
             <a:endParaRPr lang="en-US"/>
           </a:p>
@@ -378,7 +378,7 @@
     </p:spTree>
     <p:extLst>
       <p:ext uri="{BB962C8B-B14F-4D97-AF65-F5344CB8AC3E}">
-        <p14:creationId xmlns:p14="http://schemas.microsoft.com/office/powerpoint/2010/main" xmlns="" val="2023976206"/>
+        <p14:creationId xmlns:p14="http://schemas.microsoft.com/office/powerpoint/2010/main" val="2023976206"/>
       </p:ext>
     </p:extLst>
   </p:cSld>
@@ -660,7 +660,7 @@
             <a:fld id="{78C97017-6FC3-485B-9764-EAC9E56C1D49}" type="datetimeFigureOut">
               <a:rPr lang="en-US" smtClean="0"/>
               <a:pPr/>
-              <a:t>3/27/2017</a:t>
+              <a:t>3/27/17</a:t>
             </a:fld>
             <a:endParaRPr lang="en-US"/>
           </a:p>
@@ -712,7 +712,7 @@
     </p:spTree>
     <p:extLst>
       <p:ext uri="{BB962C8B-B14F-4D97-AF65-F5344CB8AC3E}">
-        <p14:creationId xmlns:p14="http://schemas.microsoft.com/office/powerpoint/2010/main" xmlns="" val="3246593157"/>
+        <p14:creationId xmlns:p14="http://schemas.microsoft.com/office/powerpoint/2010/main" val="3246593157"/>
       </p:ext>
     </p:extLst>
   </p:cSld>
@@ -832,7 +832,7 @@
             <a:fld id="{78C97017-6FC3-485B-9764-EAC9E56C1D49}" type="datetimeFigureOut">
               <a:rPr lang="en-US" smtClean="0"/>
               <a:pPr/>
-              <a:t>3/27/2017</a:t>
+              <a:t>3/27/17</a:t>
             </a:fld>
             <a:endParaRPr lang="en-US"/>
           </a:p>
@@ -884,7 +884,7 @@
     </p:spTree>
     <p:extLst>
       <p:ext uri="{BB962C8B-B14F-4D97-AF65-F5344CB8AC3E}">
-        <p14:creationId xmlns:p14="http://schemas.microsoft.com/office/powerpoint/2010/main" xmlns="" val="2707025021"/>
+        <p14:creationId xmlns:p14="http://schemas.microsoft.com/office/powerpoint/2010/main" val="2707025021"/>
       </p:ext>
     </p:extLst>
   </p:cSld>
@@ -1014,7 +1014,7 @@
             <a:fld id="{78C97017-6FC3-485B-9764-EAC9E56C1D49}" type="datetimeFigureOut">
               <a:rPr lang="en-US" smtClean="0"/>
               <a:pPr/>
-              <a:t>3/27/2017</a:t>
+              <a:t>3/27/17</a:t>
             </a:fld>
             <a:endParaRPr lang="en-US"/>
           </a:p>
@@ -1066,7 +1066,7 @@
     </p:spTree>
     <p:extLst>
       <p:ext uri="{BB962C8B-B14F-4D97-AF65-F5344CB8AC3E}">
-        <p14:creationId xmlns:p14="http://schemas.microsoft.com/office/powerpoint/2010/main" xmlns="" val="568378986"/>
+        <p14:creationId xmlns:p14="http://schemas.microsoft.com/office/powerpoint/2010/main" val="568378986"/>
       </p:ext>
     </p:extLst>
   </p:cSld>
@@ -1186,7 +1186,7 @@
             <a:fld id="{78C97017-6FC3-485B-9764-EAC9E56C1D49}" type="datetimeFigureOut">
               <a:rPr lang="en-US" smtClean="0"/>
               <a:pPr/>
-              <a:t>3/27/2017</a:t>
+              <a:t>3/27/17</a:t>
             </a:fld>
             <a:endParaRPr lang="en-US"/>
           </a:p>
@@ -1238,7 +1238,7 @@
     </p:spTree>
     <p:extLst>
       <p:ext uri="{BB962C8B-B14F-4D97-AF65-F5344CB8AC3E}">
-        <p14:creationId xmlns:p14="http://schemas.microsoft.com/office/powerpoint/2010/main" xmlns="" val="266658052"/>
+        <p14:creationId xmlns:p14="http://schemas.microsoft.com/office/powerpoint/2010/main" val="266658052"/>
       </p:ext>
     </p:extLst>
   </p:cSld>
@@ -1434,7 +1434,7 @@
             <a:fld id="{78C97017-6FC3-485B-9764-EAC9E56C1D49}" type="datetimeFigureOut">
               <a:rPr lang="en-US" smtClean="0"/>
               <a:pPr/>
-              <a:t>3/27/2017</a:t>
+              <a:t>3/27/17</a:t>
             </a:fld>
             <a:endParaRPr lang="en-US"/>
           </a:p>
@@ -1486,7 +1486,7 @@
     </p:spTree>
     <p:extLst>
       <p:ext uri="{BB962C8B-B14F-4D97-AF65-F5344CB8AC3E}">
-        <p14:creationId xmlns:p14="http://schemas.microsoft.com/office/powerpoint/2010/main" xmlns="" val="474686344"/>
+        <p14:creationId xmlns:p14="http://schemas.microsoft.com/office/powerpoint/2010/main" val="474686344"/>
       </p:ext>
     </p:extLst>
   </p:cSld>
@@ -1724,7 +1724,7 @@
             <a:fld id="{78C97017-6FC3-485B-9764-EAC9E56C1D49}" type="datetimeFigureOut">
               <a:rPr lang="en-US" smtClean="0"/>
               <a:pPr/>
-              <a:t>3/27/2017</a:t>
+              <a:t>3/27/17</a:t>
             </a:fld>
             <a:endParaRPr lang="en-US"/>
           </a:p>
@@ -1776,7 +1776,7 @@
     </p:spTree>
     <p:extLst>
       <p:ext uri="{BB962C8B-B14F-4D97-AF65-F5344CB8AC3E}">
-        <p14:creationId xmlns:p14="http://schemas.microsoft.com/office/powerpoint/2010/main" xmlns="" val="562293251"/>
+        <p14:creationId xmlns:p14="http://schemas.microsoft.com/office/powerpoint/2010/main" val="562293251"/>
       </p:ext>
     </p:extLst>
   </p:cSld>
@@ -2148,7 +2148,7 @@
             <a:fld id="{78C97017-6FC3-485B-9764-EAC9E56C1D49}" type="datetimeFigureOut">
               <a:rPr lang="en-US" smtClean="0"/>
               <a:pPr/>
-              <a:t>3/27/2017</a:t>
+              <a:t>3/27/17</a:t>
             </a:fld>
             <a:endParaRPr lang="en-US"/>
           </a:p>
@@ -2200,7 +2200,7 @@
     </p:spTree>
     <p:extLst>
       <p:ext uri="{BB962C8B-B14F-4D97-AF65-F5344CB8AC3E}">
-        <p14:creationId xmlns:p14="http://schemas.microsoft.com/office/powerpoint/2010/main" xmlns="" val="1126424250"/>
+        <p14:creationId xmlns:p14="http://schemas.microsoft.com/office/powerpoint/2010/main" val="1126424250"/>
       </p:ext>
     </p:extLst>
   </p:cSld>
@@ -2268,7 +2268,7 @@
             <a:fld id="{78C97017-6FC3-485B-9764-EAC9E56C1D49}" type="datetimeFigureOut">
               <a:rPr lang="en-US" smtClean="0"/>
               <a:pPr/>
-              <a:t>3/27/2017</a:t>
+              <a:t>3/27/17</a:t>
             </a:fld>
             <a:endParaRPr lang="en-US"/>
           </a:p>
@@ -2320,7 +2320,7 @@
     </p:spTree>
     <p:extLst>
       <p:ext uri="{BB962C8B-B14F-4D97-AF65-F5344CB8AC3E}">
-        <p14:creationId xmlns:p14="http://schemas.microsoft.com/office/powerpoint/2010/main" xmlns="" val="4159724230"/>
+        <p14:creationId xmlns:p14="http://schemas.microsoft.com/office/powerpoint/2010/main" val="4159724230"/>
       </p:ext>
     </p:extLst>
   </p:cSld>
@@ -2365,7 +2365,7 @@
             <a:fld id="{78C97017-6FC3-485B-9764-EAC9E56C1D49}" type="datetimeFigureOut">
               <a:rPr lang="en-US" smtClean="0"/>
               <a:pPr/>
-              <a:t>3/27/2017</a:t>
+              <a:t>3/27/17</a:t>
             </a:fld>
             <a:endParaRPr lang="en-US"/>
           </a:p>
@@ -2417,7 +2417,7 @@
     </p:spTree>
     <p:extLst>
       <p:ext uri="{BB962C8B-B14F-4D97-AF65-F5344CB8AC3E}">
-        <p14:creationId xmlns:p14="http://schemas.microsoft.com/office/powerpoint/2010/main" xmlns="" val="1793928710"/>
+        <p14:creationId xmlns:p14="http://schemas.microsoft.com/office/powerpoint/2010/main" val="1793928710"/>
       </p:ext>
     </p:extLst>
   </p:cSld>
@@ -2644,7 +2644,7 @@
             <a:fld id="{78C97017-6FC3-485B-9764-EAC9E56C1D49}" type="datetimeFigureOut">
               <a:rPr lang="en-US" smtClean="0"/>
               <a:pPr/>
-              <a:t>3/27/2017</a:t>
+              <a:t>3/27/17</a:t>
             </a:fld>
             <a:endParaRPr lang="en-US"/>
           </a:p>
@@ -2696,7 +2696,7 @@
     </p:spTree>
     <p:extLst>
       <p:ext uri="{BB962C8B-B14F-4D97-AF65-F5344CB8AC3E}">
-        <p14:creationId xmlns:p14="http://schemas.microsoft.com/office/powerpoint/2010/main" xmlns="" val="2076802089"/>
+        <p14:creationId xmlns:p14="http://schemas.microsoft.com/office/powerpoint/2010/main" val="2076802089"/>
       </p:ext>
     </p:extLst>
   </p:cSld>
@@ -2899,7 +2899,7 @@
             <a:fld id="{78C97017-6FC3-485B-9764-EAC9E56C1D49}" type="datetimeFigureOut">
               <a:rPr lang="en-US" smtClean="0"/>
               <a:pPr/>
-              <a:t>3/27/2017</a:t>
+              <a:t>3/27/17</a:t>
             </a:fld>
             <a:endParaRPr lang="en-US"/>
           </a:p>
@@ -2951,7 +2951,7 @@
     </p:spTree>
     <p:extLst>
       <p:ext uri="{BB962C8B-B14F-4D97-AF65-F5344CB8AC3E}">
-        <p14:creationId xmlns:p14="http://schemas.microsoft.com/office/powerpoint/2010/main" xmlns="" val="201835938"/>
+        <p14:creationId xmlns:p14="http://schemas.microsoft.com/office/powerpoint/2010/main" val="201835938"/>
       </p:ext>
     </p:extLst>
   </p:cSld>
@@ -3114,7 +3114,7 @@
             <a:fld id="{78C97017-6FC3-485B-9764-EAC9E56C1D49}" type="datetimeFigureOut">
               <a:rPr lang="en-US" smtClean="0"/>
               <a:pPr/>
-              <a:t>3/27/2017</a:t>
+              <a:t>3/27/17</a:t>
             </a:fld>
             <a:endParaRPr lang="en-US"/>
           </a:p>
@@ -3202,7 +3202,7 @@
     </p:spTree>
     <p:extLst>
       <p:ext uri="{BB962C8B-B14F-4D97-AF65-F5344CB8AC3E}">
-        <p14:creationId xmlns:p14="http://schemas.microsoft.com/office/powerpoint/2010/main" xmlns="" val="2341400630"/>
+        <p14:creationId xmlns:p14="http://schemas.microsoft.com/office/powerpoint/2010/main" val="2341400630"/>
       </p:ext>
     </p:extLst>
   </p:cSld>
@@ -3498,7 +3498,7 @@
         </p:nvSpPr>
         <p:spPr>
           <a:xfrm>
-            <a:off x="304800" y="1905000"/>
+            <a:off x="381000" y="1832423"/>
             <a:ext cx="8229600" cy="4114800"/>
           </a:xfrm>
           <a:prstGeom prst="roundRect">
@@ -3669,50 +3669,6 @@
           </a:p>
         </p:txBody>
       </p:sp>
-      <p:cxnSp>
-        <p:nvCxnSpPr>
-          <p:cNvPr id="53" name="Elbow Connector 63"/>
-          <p:cNvCxnSpPr>
-            <a:stCxn id="71" idx="3"/>
-            <a:endCxn id="89" idx="1"/>
-          </p:cNvCxnSpPr>
-          <p:nvPr/>
-        </p:nvCxnSpPr>
-        <p:spPr>
-          <a:xfrm flipV="1">
-            <a:off x="4595124" y="2230780"/>
-            <a:ext cx="1881876" cy="1485873"/>
-          </a:xfrm>
-          <a:prstGeom prst="bentConnector3">
-            <a:avLst>
-              <a:gd name="adj1" fmla="val 50000"/>
-            </a:avLst>
-          </a:prstGeom>
-          <a:ln w="19050">
-            <a:solidFill>
-              <a:srgbClr val="7030A0"/>
-            </a:solidFill>
-            <a:prstDash val="sysDot"/>
-            <a:headEnd type="none" w="med" len="med"/>
-            <a:tailEnd type="none" w="med" len="med"/>
-          </a:ln>
-          <a:effectLst/>
-        </p:spPr>
-        <p:style>
-          <a:lnRef idx="1">
-            <a:schemeClr val="accent2"/>
-          </a:lnRef>
-          <a:fillRef idx="2">
-            <a:schemeClr val="accent2"/>
-          </a:fillRef>
-          <a:effectRef idx="1">
-            <a:schemeClr val="accent2"/>
-          </a:effectRef>
-          <a:fontRef idx="minor">
-            <a:schemeClr val="dk1"/>
-          </a:fontRef>
-        </p:style>
-      </p:cxnSp>
       <p:cxnSp>
         <p:nvCxnSpPr>
           <p:cNvPr id="107" name="Elbow Connector 106"/>
@@ -3920,9 +3876,9 @@
           <p:nvPr/>
         </p:nvSpPr>
         <p:spPr>
-          <a:xfrm rot="5400000" flipV="1">
-            <a:off x="4372110" y="3628891"/>
-            <a:ext cx="270504" cy="175523"/>
+          <a:xfrm flipV="1">
+            <a:off x="6429082" y="3742150"/>
+            <a:ext cx="270504" cy="184677"/>
           </a:xfrm>
           <a:prstGeom prst="triangle">
             <a:avLst/>
@@ -4243,7 +4199,7 @@
         </p:nvSpPr>
         <p:spPr>
           <a:xfrm>
-            <a:off x="3671952" y="3025172"/>
+            <a:off x="3659833" y="2860247"/>
             <a:ext cx="1156969" cy="346760"/>
           </a:xfrm>
           <a:prstGeom prst="rect">
@@ -4366,7 +4322,7 @@
         <p:spPr>
           <a:xfrm>
             <a:off x="3405286" y="2938482"/>
-            <a:ext cx="266666" cy="260070"/>
+            <a:ext cx="254547" cy="95145"/>
           </a:xfrm>
           <a:prstGeom prst="bentConnector3">
             <a:avLst/>
@@ -4501,8 +4457,8 @@
           <p:nvPr/>
         </p:nvSpPr>
         <p:spPr>
-          <a:xfrm>
-            <a:off x="4828162" y="3121780"/>
+          <a:xfrm rot="5400000">
+            <a:off x="3982972" y="3240484"/>
             <a:ext cx="236048" cy="173380"/>
           </a:xfrm>
           <a:prstGeom prst="flowChartDecision">
@@ -4549,14 +4505,13 @@
           <p:nvPr/>
         </p:nvCxnSpPr>
         <p:spPr>
-          <a:xfrm flipH="1">
-            <a:off x="4697493" y="3208470"/>
-            <a:ext cx="366717" cy="753930"/>
-          </a:xfrm>
-          <a:prstGeom prst="bentConnector4">
+          <a:xfrm rot="16200000" flipH="1">
+            <a:off x="4140643" y="3405550"/>
+            <a:ext cx="517202" cy="596497"/>
+          </a:xfrm>
+          <a:prstGeom prst="bentConnector3">
             <a:avLst>
-              <a:gd name="adj1" fmla="val -62337"/>
-              <a:gd name="adj2" fmla="val 55749"/>
+              <a:gd name="adj1" fmla="val 50000"/>
             </a:avLst>
           </a:prstGeom>
           <a:ln w="19050">
@@ -4733,7 +4688,7 @@
         </p:nvSpPr>
         <p:spPr>
           <a:xfrm>
-            <a:off x="3276600" y="3505200"/>
+            <a:off x="5969362" y="3909559"/>
             <a:ext cx="1156969" cy="346760"/>
           </a:xfrm>
           <a:prstGeom prst="rect">
@@ -5318,21 +5273,818 @@
           </a:fontRef>
         </p:style>
       </p:cxnSp>
+      <p:sp>
+        <p:nvSpPr>
+          <p:cNvPr id="11" name="TextBox 10"/>
+          <p:cNvSpPr txBox="1"/>
+          <p:nvPr/>
+        </p:nvSpPr>
+        <p:spPr>
+          <a:xfrm>
+            <a:off x="3509907" y="2369029"/>
+            <a:ext cx="189257" cy="178683"/>
+          </a:xfrm>
+          <a:prstGeom prst="rect">
+            <a:avLst/>
+          </a:prstGeom>
+          <a:noFill/>
+        </p:spPr>
+        <p:txBody>
+          <a:bodyPr wrap="square" lIns="0" tIns="0" rIns="0" bIns="0" rtlCol="0">
+            <a:noAutofit/>
+          </a:bodyPr>
+          <a:lstStyle/>
+          <a:p>
+            <a:pPr algn="ctr"/>
+            <a:r>
+              <a:rPr lang="en-US" sz="1100" dirty="0" smtClean="0">
+                <a:solidFill>
+                  <a:srgbClr val="7030A0"/>
+                </a:solidFill>
+              </a:rPr>
+              <a:t>1</a:t>
+            </a:r>
+            <a:endParaRPr lang="en-SG" sz="1100" dirty="0">
+              <a:solidFill>
+                <a:srgbClr val="7030A0"/>
+              </a:solidFill>
+            </a:endParaRPr>
+          </a:p>
+        </p:txBody>
+      </p:sp>
+      <p:sp>
+        <p:nvSpPr>
+          <p:cNvPr id="54" name="TextBox 53"/>
+          <p:cNvSpPr txBox="1"/>
+          <p:nvPr/>
+        </p:nvSpPr>
+        <p:spPr>
+          <a:xfrm>
+            <a:off x="3509907" y="3236665"/>
+            <a:ext cx="189257" cy="178683"/>
+          </a:xfrm>
+          <a:prstGeom prst="rect">
+            <a:avLst/>
+          </a:prstGeom>
+          <a:noFill/>
+        </p:spPr>
+        <p:txBody>
+          <a:bodyPr wrap="square" lIns="0" tIns="0" rIns="0" bIns="0" rtlCol="0">
+            <a:noAutofit/>
+          </a:bodyPr>
+          <a:lstStyle/>
+          <a:p>
+            <a:pPr algn="ctr"/>
+            <a:r>
+              <a:rPr lang="en-US" sz="1100" dirty="0" smtClean="0">
+                <a:solidFill>
+                  <a:srgbClr val="7030A0"/>
+                </a:solidFill>
+              </a:rPr>
+              <a:t>1</a:t>
+            </a:r>
+            <a:endParaRPr lang="en-SG" sz="1100" dirty="0">
+              <a:solidFill>
+                <a:srgbClr val="7030A0"/>
+              </a:solidFill>
+            </a:endParaRPr>
+          </a:p>
+        </p:txBody>
+      </p:sp>
+      <p:sp>
+        <p:nvSpPr>
+          <p:cNvPr id="56" name="TextBox 55"/>
+          <p:cNvSpPr txBox="1"/>
+          <p:nvPr/>
+        </p:nvSpPr>
+        <p:spPr>
+          <a:xfrm>
+            <a:off x="5006974" y="2201599"/>
+            <a:ext cx="189257" cy="178683"/>
+          </a:xfrm>
+          <a:prstGeom prst="rect">
+            <a:avLst/>
+          </a:prstGeom>
+          <a:noFill/>
+        </p:spPr>
+        <p:txBody>
+          <a:bodyPr wrap="square" lIns="0" tIns="0" rIns="0" bIns="0" rtlCol="0">
+            <a:noAutofit/>
+          </a:bodyPr>
+          <a:lstStyle/>
+          <a:p>
+            <a:pPr algn="ctr"/>
+            <a:r>
+              <a:rPr lang="en-US" sz="1100" dirty="0" smtClean="0">
+                <a:solidFill>
+                  <a:srgbClr val="7030A0"/>
+                </a:solidFill>
+              </a:rPr>
+              <a:t>1</a:t>
+            </a:r>
+            <a:endParaRPr lang="en-SG" sz="1100" dirty="0">
+              <a:solidFill>
+                <a:srgbClr val="7030A0"/>
+              </a:solidFill>
+            </a:endParaRPr>
+          </a:p>
+        </p:txBody>
+      </p:sp>
+      <p:sp>
+        <p:nvSpPr>
+          <p:cNvPr id="60" name="TextBox 59"/>
+          <p:cNvSpPr txBox="1"/>
+          <p:nvPr/>
+        </p:nvSpPr>
+        <p:spPr>
+          <a:xfrm>
+            <a:off x="4348107" y="1956720"/>
+            <a:ext cx="189257" cy="178683"/>
+          </a:xfrm>
+          <a:prstGeom prst="rect">
+            <a:avLst/>
+          </a:prstGeom>
+          <a:noFill/>
+        </p:spPr>
+        <p:txBody>
+          <a:bodyPr wrap="square" lIns="0" tIns="0" rIns="0" bIns="0" rtlCol="0">
+            <a:noAutofit/>
+          </a:bodyPr>
+          <a:lstStyle/>
+          <a:p>
+            <a:pPr algn="ctr"/>
+            <a:r>
+              <a:rPr lang="en-US" sz="1100" dirty="0" smtClean="0">
+                <a:solidFill>
+                  <a:srgbClr val="7030A0"/>
+                </a:solidFill>
+              </a:rPr>
+              <a:t>*</a:t>
+            </a:r>
+            <a:endParaRPr lang="en-SG" sz="1100" dirty="0">
+              <a:solidFill>
+                <a:srgbClr val="7030A0"/>
+              </a:solidFill>
+            </a:endParaRPr>
+          </a:p>
+        </p:txBody>
+      </p:sp>
+      <p:sp>
+        <p:nvSpPr>
+          <p:cNvPr id="61" name="TextBox 60"/>
+          <p:cNvSpPr txBox="1"/>
+          <p:nvPr/>
+        </p:nvSpPr>
+        <p:spPr>
+          <a:xfrm>
+            <a:off x="4464444" y="3802509"/>
+            <a:ext cx="189257" cy="178683"/>
+          </a:xfrm>
+          <a:prstGeom prst="rect">
+            <a:avLst/>
+          </a:prstGeom>
+          <a:noFill/>
+        </p:spPr>
+        <p:txBody>
+          <a:bodyPr wrap="square" lIns="0" tIns="0" rIns="0" bIns="0" rtlCol="0">
+            <a:noAutofit/>
+          </a:bodyPr>
+          <a:lstStyle/>
+          <a:p>
+            <a:pPr algn="ctr"/>
+            <a:r>
+              <a:rPr lang="en-US" sz="1100" dirty="0" smtClean="0">
+                <a:solidFill>
+                  <a:srgbClr val="7030A0"/>
+                </a:solidFill>
+              </a:rPr>
+              <a:t>*</a:t>
+            </a:r>
+            <a:endParaRPr lang="en-SG" sz="1100" dirty="0">
+              <a:solidFill>
+                <a:srgbClr val="7030A0"/>
+              </a:solidFill>
+            </a:endParaRPr>
+          </a:p>
+        </p:txBody>
+      </p:sp>
+      <p:sp>
+        <p:nvSpPr>
+          <p:cNvPr id="65" name="TextBox 64"/>
+          <p:cNvSpPr txBox="1"/>
+          <p:nvPr/>
+        </p:nvSpPr>
+        <p:spPr>
+          <a:xfrm>
+            <a:off x="1872858" y="2742039"/>
+            <a:ext cx="189257" cy="178683"/>
+          </a:xfrm>
+          <a:prstGeom prst="rect">
+            <a:avLst/>
+          </a:prstGeom>
+          <a:noFill/>
+        </p:spPr>
+        <p:txBody>
+          <a:bodyPr wrap="square" lIns="0" tIns="0" rIns="0" bIns="0" rtlCol="0">
+            <a:noAutofit/>
+          </a:bodyPr>
+          <a:lstStyle/>
+          <a:p>
+            <a:pPr algn="ctr"/>
+            <a:r>
+              <a:rPr lang="en-US" sz="1100" dirty="0" smtClean="0">
+                <a:solidFill>
+                  <a:srgbClr val="7030A0"/>
+                </a:solidFill>
+              </a:rPr>
+              <a:t>1</a:t>
+            </a:r>
+            <a:endParaRPr lang="en-SG" sz="1100" dirty="0">
+              <a:solidFill>
+                <a:srgbClr val="7030A0"/>
+              </a:solidFill>
+            </a:endParaRPr>
+          </a:p>
+        </p:txBody>
+      </p:sp>
+      <p:sp>
+        <p:nvSpPr>
+          <p:cNvPr id="66" name="TextBox 65"/>
+          <p:cNvSpPr txBox="1"/>
+          <p:nvPr/>
+        </p:nvSpPr>
+        <p:spPr>
+          <a:xfrm>
+            <a:off x="1841305" y="3563851"/>
+            <a:ext cx="189257" cy="178683"/>
+          </a:xfrm>
+          <a:prstGeom prst="rect">
+            <a:avLst/>
+          </a:prstGeom>
+          <a:noFill/>
+        </p:spPr>
+        <p:txBody>
+          <a:bodyPr wrap="square" lIns="0" tIns="0" rIns="0" bIns="0" rtlCol="0">
+            <a:noAutofit/>
+          </a:bodyPr>
+          <a:lstStyle/>
+          <a:p>
+            <a:pPr algn="ctr"/>
+            <a:r>
+              <a:rPr lang="en-US" sz="1100" dirty="0" smtClean="0">
+                <a:solidFill>
+                  <a:srgbClr val="7030A0"/>
+                </a:solidFill>
+              </a:rPr>
+              <a:t>1</a:t>
+            </a:r>
+            <a:endParaRPr lang="en-SG" sz="1100" dirty="0">
+              <a:solidFill>
+                <a:srgbClr val="7030A0"/>
+              </a:solidFill>
+            </a:endParaRPr>
+          </a:p>
+        </p:txBody>
+      </p:sp>
+      <p:sp>
+        <p:nvSpPr>
+          <p:cNvPr id="70" name="TextBox 69"/>
+          <p:cNvSpPr txBox="1"/>
+          <p:nvPr/>
+        </p:nvSpPr>
+        <p:spPr>
+          <a:xfrm>
+            <a:off x="4800600" y="2971800"/>
+            <a:ext cx="189257" cy="178683"/>
+          </a:xfrm>
+          <a:prstGeom prst="rect">
+            <a:avLst/>
+          </a:prstGeom>
+          <a:noFill/>
+        </p:spPr>
+        <p:txBody>
+          <a:bodyPr wrap="square" lIns="0" tIns="0" rIns="0" bIns="0" rtlCol="0">
+            <a:noAutofit/>
+          </a:bodyPr>
+          <a:lstStyle/>
+          <a:p>
+            <a:pPr algn="ctr"/>
+            <a:r>
+              <a:rPr lang="en-US" sz="1100" dirty="0" smtClean="0">
+                <a:solidFill>
+                  <a:srgbClr val="7030A0"/>
+                </a:solidFill>
+              </a:rPr>
+              <a:t>1</a:t>
+            </a:r>
+            <a:endParaRPr lang="en-SG" sz="1100" dirty="0">
+              <a:solidFill>
+                <a:srgbClr val="7030A0"/>
+              </a:solidFill>
+            </a:endParaRPr>
+          </a:p>
+        </p:txBody>
+      </p:sp>
+      <p:sp>
+        <p:nvSpPr>
+          <p:cNvPr id="74" name="Rectangle 8"/>
+          <p:cNvSpPr/>
+          <p:nvPr/>
+        </p:nvSpPr>
+        <p:spPr>
+          <a:xfrm>
+            <a:off x="5410200" y="5562600"/>
+            <a:ext cx="708186" cy="285783"/>
+          </a:xfrm>
+          <a:prstGeom prst="rect">
+            <a:avLst/>
+          </a:prstGeom>
+          <a:ln w="19050">
+            <a:solidFill>
+              <a:srgbClr val="7030A0"/>
+            </a:solidFill>
+          </a:ln>
+          <a:effectLst/>
+        </p:spPr>
+        <p:style>
+          <a:lnRef idx="1">
+            <a:schemeClr val="accent4"/>
+          </a:lnRef>
+          <a:fillRef idx="2">
+            <a:schemeClr val="accent4"/>
+          </a:fillRef>
+          <a:effectRef idx="1">
+            <a:schemeClr val="accent4"/>
+          </a:effectRef>
+          <a:fontRef idx="minor">
+            <a:schemeClr val="dk1"/>
+          </a:fontRef>
+        </p:style>
+        <p:txBody>
+          <a:bodyPr rtlCol="0" anchor="ctr"/>
+          <a:lstStyle/>
+          <a:p>
+            <a:pPr algn="ctr"/>
+            <a:r>
+              <a:rPr lang="en-US" altLang="zh-CN" sz="1050" dirty="0" smtClean="0">
+                <a:solidFill>
+                  <a:srgbClr val="7030A0"/>
+                </a:solidFill>
+              </a:rPr>
+              <a:t>Priority</a:t>
+            </a:r>
+            <a:endParaRPr lang="en-SG" sz="1050" dirty="0">
+              <a:solidFill>
+                <a:srgbClr val="7030A0"/>
+              </a:solidFill>
+            </a:endParaRPr>
+          </a:p>
+        </p:txBody>
+      </p:sp>
+      <p:sp>
+        <p:nvSpPr>
+          <p:cNvPr id="77" name="Rectangle 76"/>
+          <p:cNvSpPr/>
+          <p:nvPr/>
+        </p:nvSpPr>
+        <p:spPr>
+          <a:xfrm>
+            <a:off x="1676400" y="5562600"/>
+            <a:ext cx="708186" cy="285783"/>
+          </a:xfrm>
+          <a:prstGeom prst="rect">
+            <a:avLst/>
+          </a:prstGeom>
+          <a:ln w="19050">
+            <a:solidFill>
+              <a:srgbClr val="7030A0"/>
+            </a:solidFill>
+          </a:ln>
+          <a:effectLst/>
+        </p:spPr>
+        <p:style>
+          <a:lnRef idx="1">
+            <a:schemeClr val="accent4"/>
+          </a:lnRef>
+          <a:fillRef idx="2">
+            <a:schemeClr val="accent4"/>
+          </a:fillRef>
+          <a:effectRef idx="1">
+            <a:schemeClr val="accent4"/>
+          </a:effectRef>
+          <a:fontRef idx="minor">
+            <a:schemeClr val="dk1"/>
+          </a:fontRef>
+        </p:style>
+        <p:txBody>
+          <a:bodyPr rtlCol="0" anchor="ctr"/>
+          <a:lstStyle>
+            <a:defPPr>
+              <a:defRPr lang="en-US"/>
+            </a:defPPr>
+            <a:lvl1pPr marL="0" algn="l" defTabSz="914400" rtl="0" eaLnBrk="1" latinLnBrk="0" hangingPunct="1">
+              <a:defRPr sz="1800" kern="1200">
+                <a:solidFill>
+                  <a:schemeClr val="dk1"/>
+                </a:solidFill>
+                <a:latin typeface="+mn-lt"/>
+                <a:ea typeface="+mn-ea"/>
+                <a:cs typeface="+mn-cs"/>
+              </a:defRPr>
+            </a:lvl1pPr>
+            <a:lvl2pPr marL="457200" algn="l" defTabSz="914400" rtl="0" eaLnBrk="1" latinLnBrk="0" hangingPunct="1">
+              <a:defRPr sz="1800" kern="1200">
+                <a:solidFill>
+                  <a:schemeClr val="dk1"/>
+                </a:solidFill>
+                <a:latin typeface="+mn-lt"/>
+                <a:ea typeface="+mn-ea"/>
+                <a:cs typeface="+mn-cs"/>
+              </a:defRPr>
+            </a:lvl2pPr>
+            <a:lvl3pPr marL="914400" algn="l" defTabSz="914400" rtl="0" eaLnBrk="1" latinLnBrk="0" hangingPunct="1">
+              <a:defRPr sz="1800" kern="1200">
+                <a:solidFill>
+                  <a:schemeClr val="dk1"/>
+                </a:solidFill>
+                <a:latin typeface="+mn-lt"/>
+                <a:ea typeface="+mn-ea"/>
+                <a:cs typeface="+mn-cs"/>
+              </a:defRPr>
+            </a:lvl3pPr>
+            <a:lvl4pPr marL="1371600" algn="l" defTabSz="914400" rtl="0" eaLnBrk="1" latinLnBrk="0" hangingPunct="1">
+              <a:defRPr sz="1800" kern="1200">
+                <a:solidFill>
+                  <a:schemeClr val="dk1"/>
+                </a:solidFill>
+                <a:latin typeface="+mn-lt"/>
+                <a:ea typeface="+mn-ea"/>
+                <a:cs typeface="+mn-cs"/>
+              </a:defRPr>
+            </a:lvl4pPr>
+            <a:lvl5pPr marL="1828800" algn="l" defTabSz="914400" rtl="0" eaLnBrk="1" latinLnBrk="0" hangingPunct="1">
+              <a:defRPr sz="1800" kern="1200">
+                <a:solidFill>
+                  <a:schemeClr val="dk1"/>
+                </a:solidFill>
+                <a:latin typeface="+mn-lt"/>
+                <a:ea typeface="+mn-ea"/>
+                <a:cs typeface="+mn-cs"/>
+              </a:defRPr>
+            </a:lvl5pPr>
+            <a:lvl6pPr marL="2286000" algn="l" defTabSz="914400" rtl="0" eaLnBrk="1" latinLnBrk="0" hangingPunct="1">
+              <a:defRPr sz="1800" kern="1200">
+                <a:solidFill>
+                  <a:schemeClr val="dk1"/>
+                </a:solidFill>
+                <a:latin typeface="+mn-lt"/>
+                <a:ea typeface="+mn-ea"/>
+                <a:cs typeface="+mn-cs"/>
+              </a:defRPr>
+            </a:lvl6pPr>
+            <a:lvl7pPr marL="2743200" algn="l" defTabSz="914400" rtl="0" eaLnBrk="1" latinLnBrk="0" hangingPunct="1">
+              <a:defRPr sz="1800" kern="1200">
+                <a:solidFill>
+                  <a:schemeClr val="dk1"/>
+                </a:solidFill>
+                <a:latin typeface="+mn-lt"/>
+                <a:ea typeface="+mn-ea"/>
+                <a:cs typeface="+mn-cs"/>
+              </a:defRPr>
+            </a:lvl7pPr>
+            <a:lvl8pPr marL="3200400" algn="l" defTabSz="914400" rtl="0" eaLnBrk="1" latinLnBrk="0" hangingPunct="1">
+              <a:defRPr sz="1800" kern="1200">
+                <a:solidFill>
+                  <a:schemeClr val="dk1"/>
+                </a:solidFill>
+                <a:latin typeface="+mn-lt"/>
+                <a:ea typeface="+mn-ea"/>
+                <a:cs typeface="+mn-cs"/>
+              </a:defRPr>
+            </a:lvl8pPr>
+            <a:lvl9pPr marL="3657600" algn="l" defTabSz="914400" rtl="0" eaLnBrk="1" latinLnBrk="0" hangingPunct="1">
+              <a:defRPr sz="1800" kern="1200">
+                <a:solidFill>
+                  <a:schemeClr val="dk1"/>
+                </a:solidFill>
+                <a:latin typeface="+mn-lt"/>
+                <a:ea typeface="+mn-ea"/>
+                <a:cs typeface="+mn-cs"/>
+              </a:defRPr>
+            </a:lvl9pPr>
+          </a:lstStyle>
+          <a:p>
+            <a:pPr algn="ctr"/>
+            <a:r>
+              <a:rPr lang="en-US" altLang="zh-CN" sz="1050" dirty="0" smtClean="0">
+                <a:solidFill>
+                  <a:srgbClr val="7030A0"/>
+                </a:solidFill>
+              </a:rPr>
+              <a:t>Due</a:t>
+            </a:r>
+            <a:r>
+              <a:rPr lang="zh-CN" altLang="en-US" sz="1050" dirty="0" smtClean="0">
+                <a:solidFill>
+                  <a:srgbClr val="7030A0"/>
+                </a:solidFill>
+              </a:rPr>
+              <a:t> </a:t>
+            </a:r>
+            <a:r>
+              <a:rPr lang="en-US" altLang="zh-CN" sz="1050" dirty="0" smtClean="0">
+                <a:solidFill>
+                  <a:srgbClr val="7030A0"/>
+                </a:solidFill>
+              </a:rPr>
+              <a:t>date</a:t>
+            </a:r>
+            <a:endParaRPr lang="en-SG" sz="1050" dirty="0">
+              <a:solidFill>
+                <a:srgbClr val="7030A0"/>
+              </a:solidFill>
+            </a:endParaRPr>
+          </a:p>
+        </p:txBody>
+      </p:sp>
+      <p:sp>
+        <p:nvSpPr>
+          <p:cNvPr id="88" name="Rectangle 87"/>
+          <p:cNvSpPr/>
+          <p:nvPr/>
+        </p:nvSpPr>
+        <p:spPr>
+          <a:xfrm>
+            <a:off x="762000" y="5562600"/>
+            <a:ext cx="708186" cy="285783"/>
+          </a:xfrm>
+          <a:prstGeom prst="rect">
+            <a:avLst/>
+          </a:prstGeom>
+          <a:ln w="19050">
+            <a:solidFill>
+              <a:srgbClr val="7030A0"/>
+            </a:solidFill>
+          </a:ln>
+          <a:effectLst/>
+        </p:spPr>
+        <p:style>
+          <a:lnRef idx="1">
+            <a:schemeClr val="accent4"/>
+          </a:lnRef>
+          <a:fillRef idx="2">
+            <a:schemeClr val="accent4"/>
+          </a:fillRef>
+          <a:effectRef idx="1">
+            <a:schemeClr val="accent4"/>
+          </a:effectRef>
+          <a:fontRef idx="minor">
+            <a:schemeClr val="dk1"/>
+          </a:fontRef>
+        </p:style>
+        <p:txBody>
+          <a:bodyPr rtlCol="0" anchor="ctr"/>
+          <a:lstStyle>
+            <a:defPPr>
+              <a:defRPr lang="en-US"/>
+            </a:defPPr>
+            <a:lvl1pPr marL="0" algn="l" defTabSz="914400" rtl="0" eaLnBrk="1" latinLnBrk="0" hangingPunct="1">
+              <a:defRPr sz="1800" kern="1200">
+                <a:solidFill>
+                  <a:schemeClr val="dk1"/>
+                </a:solidFill>
+                <a:latin typeface="+mn-lt"/>
+                <a:ea typeface="+mn-ea"/>
+                <a:cs typeface="+mn-cs"/>
+              </a:defRPr>
+            </a:lvl1pPr>
+            <a:lvl2pPr marL="457200" algn="l" defTabSz="914400" rtl="0" eaLnBrk="1" latinLnBrk="0" hangingPunct="1">
+              <a:defRPr sz="1800" kern="1200">
+                <a:solidFill>
+                  <a:schemeClr val="dk1"/>
+                </a:solidFill>
+                <a:latin typeface="+mn-lt"/>
+                <a:ea typeface="+mn-ea"/>
+                <a:cs typeface="+mn-cs"/>
+              </a:defRPr>
+            </a:lvl2pPr>
+            <a:lvl3pPr marL="914400" algn="l" defTabSz="914400" rtl="0" eaLnBrk="1" latinLnBrk="0" hangingPunct="1">
+              <a:defRPr sz="1800" kern="1200">
+                <a:solidFill>
+                  <a:schemeClr val="dk1"/>
+                </a:solidFill>
+                <a:latin typeface="+mn-lt"/>
+                <a:ea typeface="+mn-ea"/>
+                <a:cs typeface="+mn-cs"/>
+              </a:defRPr>
+            </a:lvl3pPr>
+            <a:lvl4pPr marL="1371600" algn="l" defTabSz="914400" rtl="0" eaLnBrk="1" latinLnBrk="0" hangingPunct="1">
+              <a:defRPr sz="1800" kern="1200">
+                <a:solidFill>
+                  <a:schemeClr val="dk1"/>
+                </a:solidFill>
+                <a:latin typeface="+mn-lt"/>
+                <a:ea typeface="+mn-ea"/>
+                <a:cs typeface="+mn-cs"/>
+              </a:defRPr>
+            </a:lvl4pPr>
+            <a:lvl5pPr marL="1828800" algn="l" defTabSz="914400" rtl="0" eaLnBrk="1" latinLnBrk="0" hangingPunct="1">
+              <a:defRPr sz="1800" kern="1200">
+                <a:solidFill>
+                  <a:schemeClr val="dk1"/>
+                </a:solidFill>
+                <a:latin typeface="+mn-lt"/>
+                <a:ea typeface="+mn-ea"/>
+                <a:cs typeface="+mn-cs"/>
+              </a:defRPr>
+            </a:lvl5pPr>
+            <a:lvl6pPr marL="2286000" algn="l" defTabSz="914400" rtl="0" eaLnBrk="1" latinLnBrk="0" hangingPunct="1">
+              <a:defRPr sz="1800" kern="1200">
+                <a:solidFill>
+                  <a:schemeClr val="dk1"/>
+                </a:solidFill>
+                <a:latin typeface="+mn-lt"/>
+                <a:ea typeface="+mn-ea"/>
+                <a:cs typeface="+mn-cs"/>
+              </a:defRPr>
+            </a:lvl6pPr>
+            <a:lvl7pPr marL="2743200" algn="l" defTabSz="914400" rtl="0" eaLnBrk="1" latinLnBrk="0" hangingPunct="1">
+              <a:defRPr sz="1800" kern="1200">
+                <a:solidFill>
+                  <a:schemeClr val="dk1"/>
+                </a:solidFill>
+                <a:latin typeface="+mn-lt"/>
+                <a:ea typeface="+mn-ea"/>
+                <a:cs typeface="+mn-cs"/>
+              </a:defRPr>
+            </a:lvl7pPr>
+            <a:lvl8pPr marL="3200400" algn="l" defTabSz="914400" rtl="0" eaLnBrk="1" latinLnBrk="0" hangingPunct="1">
+              <a:defRPr sz="1800" kern="1200">
+                <a:solidFill>
+                  <a:schemeClr val="dk1"/>
+                </a:solidFill>
+                <a:latin typeface="+mn-lt"/>
+                <a:ea typeface="+mn-ea"/>
+                <a:cs typeface="+mn-cs"/>
+              </a:defRPr>
+            </a:lvl8pPr>
+            <a:lvl9pPr marL="3657600" algn="l" defTabSz="914400" rtl="0" eaLnBrk="1" latinLnBrk="0" hangingPunct="1">
+              <a:defRPr sz="1800" kern="1200">
+                <a:solidFill>
+                  <a:schemeClr val="dk1"/>
+                </a:solidFill>
+                <a:latin typeface="+mn-lt"/>
+                <a:ea typeface="+mn-ea"/>
+                <a:cs typeface="+mn-cs"/>
+              </a:defRPr>
+            </a:lvl9pPr>
+          </a:lstStyle>
+          <a:p>
+            <a:pPr algn="ctr"/>
+            <a:r>
+              <a:rPr lang="en-US" altLang="zh-CN" sz="1050" dirty="0" smtClean="0">
+                <a:solidFill>
+                  <a:srgbClr val="7030A0"/>
+                </a:solidFill>
+              </a:rPr>
+              <a:t>Name</a:t>
+            </a:r>
+            <a:endParaRPr lang="en-SG" sz="1050" dirty="0">
+              <a:solidFill>
+                <a:srgbClr val="7030A0"/>
+              </a:solidFill>
+            </a:endParaRPr>
+          </a:p>
+        </p:txBody>
+      </p:sp>
+      <p:sp>
+        <p:nvSpPr>
+          <p:cNvPr id="73" name="Rectangle 8"/>
+          <p:cNvSpPr/>
+          <p:nvPr/>
+        </p:nvSpPr>
+        <p:spPr>
+          <a:xfrm>
+            <a:off x="6400800" y="5562600"/>
+            <a:ext cx="708186" cy="285783"/>
+          </a:xfrm>
+          <a:prstGeom prst="rect">
+            <a:avLst/>
+          </a:prstGeom>
+          <a:ln w="19050">
+            <a:solidFill>
+              <a:srgbClr val="7030A0"/>
+            </a:solidFill>
+          </a:ln>
+          <a:effectLst/>
+        </p:spPr>
+        <p:style>
+          <a:lnRef idx="1">
+            <a:schemeClr val="accent4"/>
+          </a:lnRef>
+          <a:fillRef idx="2">
+            <a:schemeClr val="accent4"/>
+          </a:fillRef>
+          <a:effectRef idx="1">
+            <a:schemeClr val="accent4"/>
+          </a:effectRef>
+          <a:fontRef idx="minor">
+            <a:schemeClr val="dk1"/>
+          </a:fontRef>
+        </p:style>
+        <p:txBody>
+          <a:bodyPr rtlCol="0" anchor="ctr"/>
+          <a:lstStyle/>
+          <a:p>
+            <a:pPr algn="ctr"/>
+            <a:r>
+              <a:rPr lang="en-US" altLang="zh-CN" sz="1050" dirty="0" smtClean="0">
+                <a:solidFill>
+                  <a:srgbClr val="7030A0"/>
+                </a:solidFill>
+              </a:rPr>
+              <a:t>Favorite</a:t>
+            </a:r>
+            <a:endParaRPr lang="en-SG" sz="1050" dirty="0">
+              <a:solidFill>
+                <a:srgbClr val="7030A0"/>
+              </a:solidFill>
+            </a:endParaRPr>
+          </a:p>
+        </p:txBody>
+      </p:sp>
+      <p:sp>
+        <p:nvSpPr>
+          <p:cNvPr id="90" name="Rectangle 8"/>
+          <p:cNvSpPr/>
+          <p:nvPr/>
+        </p:nvSpPr>
+        <p:spPr>
+          <a:xfrm>
+            <a:off x="7391400" y="5562600"/>
+            <a:ext cx="708186" cy="285783"/>
+          </a:xfrm>
+          <a:prstGeom prst="rect">
+            <a:avLst/>
+          </a:prstGeom>
+          <a:ln w="19050">
+            <a:solidFill>
+              <a:srgbClr val="7030A0"/>
+            </a:solidFill>
+          </a:ln>
+          <a:effectLst/>
+        </p:spPr>
+        <p:style>
+          <a:lnRef idx="1">
+            <a:schemeClr val="accent4"/>
+          </a:lnRef>
+          <a:fillRef idx="2">
+            <a:schemeClr val="accent4"/>
+          </a:fillRef>
+          <a:effectRef idx="1">
+            <a:schemeClr val="accent4"/>
+          </a:effectRef>
+          <a:fontRef idx="minor">
+            <a:schemeClr val="dk1"/>
+          </a:fontRef>
+        </p:style>
+        <p:txBody>
+          <a:bodyPr rtlCol="0" anchor="ctr"/>
+          <a:lstStyle/>
+          <a:p>
+            <a:pPr algn="ctr"/>
+            <a:r>
+              <a:rPr lang="en-US" altLang="zh-CN" sz="1050" dirty="0" smtClean="0">
+                <a:solidFill>
+                  <a:srgbClr val="7030A0"/>
+                </a:solidFill>
+              </a:rPr>
+              <a:t>Finished</a:t>
+            </a:r>
+            <a:endParaRPr lang="en-SG" sz="1050" dirty="0">
+              <a:solidFill>
+                <a:srgbClr val="7030A0"/>
+              </a:solidFill>
+            </a:endParaRPr>
+          </a:p>
+        </p:txBody>
+      </p:sp>
       <p:cxnSp>
         <p:nvCxnSpPr>
-          <p:cNvPr id="50" name="Elbow Connector 49"/>
-          <p:cNvCxnSpPr>
-            <a:endCxn id="67" idx="3"/>
-          </p:cNvCxnSpPr>
+          <p:cNvPr id="93" name="Elbow Connector 92"/>
+          <p:cNvCxnSpPr/>
           <p:nvPr/>
         </p:nvCxnSpPr>
         <p:spPr>
-          <a:xfrm rot="16200000" flipV="1">
-            <a:off x="4991046" y="2174207"/>
-            <a:ext cx="875354" cy="847965"/>
-          </a:xfrm>
-          <a:prstGeom prst="bentConnector2">
-            <a:avLst/>
+          <a:xfrm flipH="1">
+            <a:off x="4885557" y="2158993"/>
+            <a:ext cx="128525" cy="1822199"/>
+          </a:xfrm>
+          <a:prstGeom prst="bentConnector4">
+            <a:avLst>
+              <a:gd name="adj1" fmla="val -177864"/>
+              <a:gd name="adj2" fmla="val 84866"/>
+            </a:avLst>
           </a:prstGeom>
           <a:ln w="19050">
             <a:solidFill>
@@ -5360,13 +6112,13 @@
       </p:cxnSp>
       <p:sp>
         <p:nvSpPr>
-          <p:cNvPr id="11" name="TextBox 10"/>
+          <p:cNvPr id="94" name="TextBox 93"/>
           <p:cNvSpPr txBox="1"/>
           <p:nvPr/>
         </p:nvSpPr>
         <p:spPr>
           <a:xfrm>
-            <a:off x="3509907" y="2369029"/>
+            <a:off x="4967094" y="3782321"/>
             <a:ext cx="189257" cy="178683"/>
           </a:xfrm>
           <a:prstGeom prst="rect">
@@ -5382,12 +6134,12 @@
           <a:p>
             <a:pPr algn="ctr"/>
             <a:r>
-              <a:rPr lang="en-US" sz="1100" dirty="0" smtClean="0">
+              <a:rPr lang="zh-CN" altLang="en-US" sz="1100" dirty="0">
                 <a:solidFill>
                   <a:srgbClr val="7030A0"/>
                 </a:solidFill>
               </a:rPr>
-              <a:t>1</a:t>
+              <a:t>*</a:t>
             </a:r>
             <a:endParaRPr lang="en-SG" sz="1100" dirty="0">
               <a:solidFill>
@@ -5399,287 +6151,14 @@
       </p:sp>
       <p:sp>
         <p:nvSpPr>
-          <p:cNvPr id="54" name="TextBox 53"/>
-          <p:cNvSpPr txBox="1"/>
-          <p:nvPr/>
-        </p:nvSpPr>
-        <p:spPr>
-          <a:xfrm>
-            <a:off x="3509907" y="3236665"/>
-            <a:ext cx="189257" cy="178683"/>
-          </a:xfrm>
-          <a:prstGeom prst="rect">
-            <a:avLst/>
-          </a:prstGeom>
-          <a:noFill/>
-        </p:spPr>
-        <p:txBody>
-          <a:bodyPr wrap="square" lIns="0" tIns="0" rIns="0" bIns="0" rtlCol="0">
-            <a:noAutofit/>
-          </a:bodyPr>
-          <a:lstStyle/>
-          <a:p>
-            <a:pPr algn="ctr"/>
-            <a:r>
-              <a:rPr lang="en-US" sz="1100" dirty="0" smtClean="0">
-                <a:solidFill>
-                  <a:srgbClr val="7030A0"/>
-                </a:solidFill>
-              </a:rPr>
-              <a:t>1</a:t>
-            </a:r>
-            <a:endParaRPr lang="en-SG" sz="1100" dirty="0">
-              <a:solidFill>
-                <a:srgbClr val="7030A0"/>
-              </a:solidFill>
-            </a:endParaRPr>
-          </a:p>
-        </p:txBody>
-      </p:sp>
-      <p:sp>
-        <p:nvSpPr>
-          <p:cNvPr id="56" name="TextBox 55"/>
-          <p:cNvSpPr txBox="1"/>
-          <p:nvPr/>
-        </p:nvSpPr>
-        <p:spPr>
-          <a:xfrm>
-            <a:off x="5006974" y="2201599"/>
-            <a:ext cx="189257" cy="178683"/>
-          </a:xfrm>
-          <a:prstGeom prst="rect">
-            <a:avLst/>
-          </a:prstGeom>
-          <a:noFill/>
-        </p:spPr>
-        <p:txBody>
-          <a:bodyPr wrap="square" lIns="0" tIns="0" rIns="0" bIns="0" rtlCol="0">
-            <a:noAutofit/>
-          </a:bodyPr>
-          <a:lstStyle/>
-          <a:p>
-            <a:pPr algn="ctr"/>
-            <a:r>
-              <a:rPr lang="en-US" sz="1100" dirty="0" smtClean="0">
-                <a:solidFill>
-                  <a:srgbClr val="7030A0"/>
-                </a:solidFill>
-              </a:rPr>
-              <a:t>1</a:t>
-            </a:r>
-            <a:endParaRPr lang="en-SG" sz="1100" dirty="0">
-              <a:solidFill>
-                <a:srgbClr val="7030A0"/>
-              </a:solidFill>
-            </a:endParaRPr>
-          </a:p>
-        </p:txBody>
-      </p:sp>
-      <p:sp>
-        <p:nvSpPr>
-          <p:cNvPr id="60" name="TextBox 59"/>
-          <p:cNvSpPr txBox="1"/>
-          <p:nvPr/>
-        </p:nvSpPr>
-        <p:spPr>
-          <a:xfrm>
-            <a:off x="4348107" y="1956720"/>
-            <a:ext cx="189257" cy="178683"/>
-          </a:xfrm>
-          <a:prstGeom prst="rect">
-            <a:avLst/>
-          </a:prstGeom>
-          <a:noFill/>
-        </p:spPr>
-        <p:txBody>
-          <a:bodyPr wrap="square" lIns="0" tIns="0" rIns="0" bIns="0" rtlCol="0">
-            <a:noAutofit/>
-          </a:bodyPr>
-          <a:lstStyle/>
-          <a:p>
-            <a:pPr algn="ctr"/>
-            <a:r>
-              <a:rPr lang="en-US" sz="1100" dirty="0" smtClean="0">
-                <a:solidFill>
-                  <a:srgbClr val="7030A0"/>
-                </a:solidFill>
-              </a:rPr>
-              <a:t>*</a:t>
-            </a:r>
-            <a:endParaRPr lang="en-SG" sz="1100" dirty="0">
-              <a:solidFill>
-                <a:srgbClr val="7030A0"/>
-              </a:solidFill>
-            </a:endParaRPr>
-          </a:p>
-        </p:txBody>
-      </p:sp>
-      <p:sp>
-        <p:nvSpPr>
-          <p:cNvPr id="61" name="TextBox 60"/>
-          <p:cNvSpPr txBox="1"/>
-          <p:nvPr/>
-        </p:nvSpPr>
-        <p:spPr>
-          <a:xfrm>
-            <a:off x="5105400" y="3200400"/>
-            <a:ext cx="189257" cy="178683"/>
-          </a:xfrm>
-          <a:prstGeom prst="rect">
-            <a:avLst/>
-          </a:prstGeom>
-          <a:noFill/>
-        </p:spPr>
-        <p:txBody>
-          <a:bodyPr wrap="square" lIns="0" tIns="0" rIns="0" bIns="0" rtlCol="0">
-            <a:noAutofit/>
-          </a:bodyPr>
-          <a:lstStyle/>
-          <a:p>
-            <a:pPr algn="ctr"/>
-            <a:r>
-              <a:rPr lang="en-US" sz="1100" dirty="0" smtClean="0">
-                <a:solidFill>
-                  <a:srgbClr val="7030A0"/>
-                </a:solidFill>
-              </a:rPr>
-              <a:t>*</a:t>
-            </a:r>
-            <a:endParaRPr lang="en-SG" sz="1100" dirty="0">
-              <a:solidFill>
-                <a:srgbClr val="7030A0"/>
-              </a:solidFill>
-            </a:endParaRPr>
-          </a:p>
-        </p:txBody>
-      </p:sp>
-      <p:sp>
-        <p:nvSpPr>
-          <p:cNvPr id="65" name="TextBox 64"/>
-          <p:cNvSpPr txBox="1"/>
-          <p:nvPr/>
-        </p:nvSpPr>
-        <p:spPr>
-          <a:xfrm>
-            <a:off x="1872858" y="2742039"/>
-            <a:ext cx="189257" cy="178683"/>
-          </a:xfrm>
-          <a:prstGeom prst="rect">
-            <a:avLst/>
-          </a:prstGeom>
-          <a:noFill/>
-        </p:spPr>
-        <p:txBody>
-          <a:bodyPr wrap="square" lIns="0" tIns="0" rIns="0" bIns="0" rtlCol="0">
-            <a:noAutofit/>
-          </a:bodyPr>
-          <a:lstStyle/>
-          <a:p>
-            <a:pPr algn="ctr"/>
-            <a:r>
-              <a:rPr lang="en-US" sz="1100" dirty="0" smtClean="0">
-                <a:solidFill>
-                  <a:srgbClr val="7030A0"/>
-                </a:solidFill>
-              </a:rPr>
-              <a:t>1</a:t>
-            </a:r>
-            <a:endParaRPr lang="en-SG" sz="1100" dirty="0">
-              <a:solidFill>
-                <a:srgbClr val="7030A0"/>
-              </a:solidFill>
-            </a:endParaRPr>
-          </a:p>
-        </p:txBody>
-      </p:sp>
-      <p:sp>
-        <p:nvSpPr>
-          <p:cNvPr id="66" name="TextBox 65"/>
-          <p:cNvSpPr txBox="1"/>
-          <p:nvPr/>
-        </p:nvSpPr>
-        <p:spPr>
-          <a:xfrm>
-            <a:off x="1841305" y="3563851"/>
-            <a:ext cx="189257" cy="178683"/>
-          </a:xfrm>
-          <a:prstGeom prst="rect">
-            <a:avLst/>
-          </a:prstGeom>
-          <a:noFill/>
-        </p:spPr>
-        <p:txBody>
-          <a:bodyPr wrap="square" lIns="0" tIns="0" rIns="0" bIns="0" rtlCol="0">
-            <a:noAutofit/>
-          </a:bodyPr>
-          <a:lstStyle/>
-          <a:p>
-            <a:pPr algn="ctr"/>
-            <a:r>
-              <a:rPr lang="en-US" sz="1100" dirty="0" smtClean="0">
-                <a:solidFill>
-                  <a:srgbClr val="7030A0"/>
-                </a:solidFill>
-              </a:rPr>
-              <a:t>1</a:t>
-            </a:r>
-            <a:endParaRPr lang="en-SG" sz="1100" dirty="0">
-              <a:solidFill>
-                <a:srgbClr val="7030A0"/>
-              </a:solidFill>
-            </a:endParaRPr>
-          </a:p>
-        </p:txBody>
-      </p:sp>
-      <p:sp>
-        <p:nvSpPr>
-          <p:cNvPr id="70" name="TextBox 69"/>
-          <p:cNvSpPr txBox="1"/>
-          <p:nvPr/>
-        </p:nvSpPr>
-        <p:spPr>
-          <a:xfrm>
-            <a:off x="4800600" y="2971800"/>
-            <a:ext cx="189257" cy="178683"/>
-          </a:xfrm>
-          <a:prstGeom prst="rect">
-            <a:avLst/>
-          </a:prstGeom>
-          <a:noFill/>
-        </p:spPr>
-        <p:txBody>
-          <a:bodyPr wrap="square" lIns="0" tIns="0" rIns="0" bIns="0" rtlCol="0">
-            <a:noAutofit/>
-          </a:bodyPr>
-          <a:lstStyle/>
-          <a:p>
-            <a:pPr algn="ctr"/>
-            <a:r>
-              <a:rPr lang="en-US" sz="1100" dirty="0" smtClean="0">
-                <a:solidFill>
-                  <a:srgbClr val="7030A0"/>
-                </a:solidFill>
-              </a:rPr>
-              <a:t>1</a:t>
-            </a:r>
-            <a:endParaRPr lang="en-SG" sz="1100" dirty="0">
-              <a:solidFill>
-                <a:srgbClr val="7030A0"/>
-              </a:solidFill>
-            </a:endParaRPr>
-          </a:p>
-        </p:txBody>
-      </p:sp>
-      <p:sp>
-        <p:nvSpPr>
-          <p:cNvPr id="74" name="Rectangle 8"/>
+          <p:cNvPr id="89" name="Rectangle 8"/>
           <p:cNvSpPr/>
           <p:nvPr/>
         </p:nvSpPr>
         <p:spPr>
           <a:xfrm>
-            <a:off x="5410200" y="5562600"/>
-            <a:ext cx="708186" cy="285783"/>
+            <a:off x="5958340" y="2927761"/>
+            <a:ext cx="1135778" cy="346760"/>
           </a:xfrm>
           <a:prstGeom prst="rect">
             <a:avLst/>
@@ -5711,12 +6190,35 @@
           <a:p>
             <a:pPr algn="ctr"/>
             <a:r>
-              <a:rPr lang="en-US" altLang="zh-CN" sz="1050" dirty="0" smtClean="0">
+              <a:rPr lang="en-US" sz="1050" dirty="0" smtClean="0">
                 <a:solidFill>
                   <a:srgbClr val="7030A0"/>
                 </a:solidFill>
               </a:rPr>
-              <a:t>Priority</a:t>
+              <a:t>&lt;&lt;interface&gt;&gt;</a:t>
+            </a:r>
+            <a:br>
+              <a:rPr lang="en-US" sz="1050" dirty="0" smtClean="0">
+                <a:solidFill>
+                  <a:srgbClr val="7030A0"/>
+                </a:solidFill>
+              </a:rPr>
+            </a:br>
+            <a:r>
+              <a:rPr lang="en-US" sz="1050" dirty="0" err="1" smtClean="0">
+                <a:solidFill>
+                  <a:srgbClr val="7030A0"/>
+                </a:solidFill>
+              </a:rPr>
+              <a:t>ReadOnly</a:t>
+            </a:r>
+            <a:r>
+              <a:rPr lang="en-US" altLang="zh-CN" sz="1050" dirty="0" err="1" smtClean="0">
+                <a:solidFill>
+                  <a:srgbClr val="7030A0"/>
+                </a:solidFill>
+              </a:rPr>
+              <a:t>Event</a:t>
             </a:r>
             <a:endParaRPr lang="en-SG" sz="1050" dirty="0">
               <a:solidFill>
@@ -5728,14 +6230,14 @@
       </p:sp>
       <p:sp>
         <p:nvSpPr>
-          <p:cNvPr id="77" name="Rectangle 76"/>
+          <p:cNvPr id="101" name="Rectangle 8"/>
           <p:cNvSpPr/>
           <p:nvPr/>
         </p:nvSpPr>
         <p:spPr>
           <a:xfrm>
-            <a:off x="1676400" y="5562600"/>
-            <a:ext cx="708186" cy="285783"/>
+            <a:off x="7727518" y="2938482"/>
+            <a:ext cx="708186" cy="346760"/>
           </a:xfrm>
           <a:prstGeom prst="rect">
             <a:avLst/>
@@ -5763,101 +6265,7 @@
         </p:style>
         <p:txBody>
           <a:bodyPr rtlCol="0" anchor="ctr"/>
-          <a:lstStyle>
-            <a:defPPr>
-              <a:defRPr lang="en-US"/>
-            </a:defPPr>
-            <a:lvl1pPr marL="0" algn="l" defTabSz="914400" rtl="0" eaLnBrk="1" latinLnBrk="0" hangingPunct="1">
-              <a:defRPr sz="1800" kern="1200">
-                <a:solidFill>
-                  <a:schemeClr val="dk1"/>
-                </a:solidFill>
-                <a:latin typeface="+mn-lt"/>
-                <a:ea typeface="+mn-ea"/>
-                <a:cs typeface="+mn-cs"/>
-              </a:defRPr>
-            </a:lvl1pPr>
-            <a:lvl2pPr marL="457200" algn="l" defTabSz="914400" rtl="0" eaLnBrk="1" latinLnBrk="0" hangingPunct="1">
-              <a:defRPr sz="1800" kern="1200">
-                <a:solidFill>
-                  <a:schemeClr val="dk1"/>
-                </a:solidFill>
-                <a:latin typeface="+mn-lt"/>
-                <a:ea typeface="+mn-ea"/>
-                <a:cs typeface="+mn-cs"/>
-              </a:defRPr>
-            </a:lvl2pPr>
-            <a:lvl3pPr marL="914400" algn="l" defTabSz="914400" rtl="0" eaLnBrk="1" latinLnBrk="0" hangingPunct="1">
-              <a:defRPr sz="1800" kern="1200">
-                <a:solidFill>
-                  <a:schemeClr val="dk1"/>
-                </a:solidFill>
-                <a:latin typeface="+mn-lt"/>
-                <a:ea typeface="+mn-ea"/>
-                <a:cs typeface="+mn-cs"/>
-              </a:defRPr>
-            </a:lvl3pPr>
-            <a:lvl4pPr marL="1371600" algn="l" defTabSz="914400" rtl="0" eaLnBrk="1" latinLnBrk="0" hangingPunct="1">
-              <a:defRPr sz="1800" kern="1200">
-                <a:solidFill>
-                  <a:schemeClr val="dk1"/>
-                </a:solidFill>
-                <a:latin typeface="+mn-lt"/>
-                <a:ea typeface="+mn-ea"/>
-                <a:cs typeface="+mn-cs"/>
-              </a:defRPr>
-            </a:lvl4pPr>
-            <a:lvl5pPr marL="1828800" algn="l" defTabSz="914400" rtl="0" eaLnBrk="1" latinLnBrk="0" hangingPunct="1">
-              <a:defRPr sz="1800" kern="1200">
-                <a:solidFill>
-                  <a:schemeClr val="dk1"/>
-                </a:solidFill>
-                <a:latin typeface="+mn-lt"/>
-                <a:ea typeface="+mn-ea"/>
-                <a:cs typeface="+mn-cs"/>
-              </a:defRPr>
-            </a:lvl5pPr>
-            <a:lvl6pPr marL="2286000" algn="l" defTabSz="914400" rtl="0" eaLnBrk="1" latinLnBrk="0" hangingPunct="1">
-              <a:defRPr sz="1800" kern="1200">
-                <a:solidFill>
-                  <a:schemeClr val="dk1"/>
-                </a:solidFill>
-                <a:latin typeface="+mn-lt"/>
-                <a:ea typeface="+mn-ea"/>
-                <a:cs typeface="+mn-cs"/>
-              </a:defRPr>
-            </a:lvl6pPr>
-            <a:lvl7pPr marL="2743200" algn="l" defTabSz="914400" rtl="0" eaLnBrk="1" latinLnBrk="0" hangingPunct="1">
-              <a:defRPr sz="1800" kern="1200">
-                <a:solidFill>
-                  <a:schemeClr val="dk1"/>
-                </a:solidFill>
-                <a:latin typeface="+mn-lt"/>
-                <a:ea typeface="+mn-ea"/>
-                <a:cs typeface="+mn-cs"/>
-              </a:defRPr>
-            </a:lvl7pPr>
-            <a:lvl8pPr marL="3200400" algn="l" defTabSz="914400" rtl="0" eaLnBrk="1" latinLnBrk="0" hangingPunct="1">
-              <a:defRPr sz="1800" kern="1200">
-                <a:solidFill>
-                  <a:schemeClr val="dk1"/>
-                </a:solidFill>
-                <a:latin typeface="+mn-lt"/>
-                <a:ea typeface="+mn-ea"/>
-                <a:cs typeface="+mn-cs"/>
-              </a:defRPr>
-            </a:lvl8pPr>
-            <a:lvl9pPr marL="3657600" algn="l" defTabSz="914400" rtl="0" eaLnBrk="1" latinLnBrk="0" hangingPunct="1">
-              <a:defRPr sz="1800" kern="1200">
-                <a:solidFill>
-                  <a:schemeClr val="dk1"/>
-                </a:solidFill>
-                <a:latin typeface="+mn-lt"/>
-                <a:ea typeface="+mn-ea"/>
-                <a:cs typeface="+mn-cs"/>
-              </a:defRPr>
-            </a:lvl9pPr>
-          </a:lstStyle>
+          <a:lstStyle/>
           <a:p>
             <a:pPr algn="ctr"/>
             <a:r>
@@ -5866,23 +6274,7 @@
                   <a:srgbClr val="7030A0"/>
                 </a:solidFill>
               </a:rPr>
-              <a:t>Due</a:t>
-            </a:r>
-            <a:r>
-              <a:rPr lang="zh-CN" altLang="en-US" sz="1050" dirty="0" smtClean="0">
-                <a:solidFill>
-                  <a:srgbClr val="7030A0"/>
-                </a:solidFill>
-              </a:rPr>
-              <a:t> </a:t>
-            </a:r>
-            <a:r>
-              <a:rPr lang="en-US" altLang="zh-CN" sz="1050" dirty="0" smtClean="0">
-                <a:solidFill>
-                  <a:srgbClr val="7030A0"/>
-                </a:solidFill>
-              </a:rPr>
-              <a:t>date</a:t>
+              <a:t>Event</a:t>
             </a:r>
             <a:endParaRPr lang="en-SG" sz="1050" dirty="0">
               <a:solidFill>
@@ -5894,14 +6286,14 @@
       </p:sp>
       <p:sp>
         <p:nvSpPr>
-          <p:cNvPr id="88" name="Rectangle 87"/>
+          <p:cNvPr id="104" name="Rectangle 8"/>
           <p:cNvSpPr/>
           <p:nvPr/>
         </p:nvSpPr>
         <p:spPr>
           <a:xfrm>
-            <a:off x="762000" y="5562600"/>
-            <a:ext cx="708186" cy="285783"/>
+            <a:off x="4343400" y="3962400"/>
+            <a:ext cx="708186" cy="346760"/>
           </a:xfrm>
           <a:prstGeom prst="rect">
             <a:avLst/>
@@ -5929,101 +6321,7 @@
         </p:style>
         <p:txBody>
           <a:bodyPr rtlCol="0" anchor="ctr"/>
-          <a:lstStyle>
-            <a:defPPr>
-              <a:defRPr lang="en-US"/>
-            </a:defPPr>
-            <a:lvl1pPr marL="0" algn="l" defTabSz="914400" rtl="0" eaLnBrk="1" latinLnBrk="0" hangingPunct="1">
-              <a:defRPr sz="1800" kern="1200">
-                <a:solidFill>
-                  <a:schemeClr val="dk1"/>
-                </a:solidFill>
-                <a:latin typeface="+mn-lt"/>
-                <a:ea typeface="+mn-ea"/>
-                <a:cs typeface="+mn-cs"/>
-              </a:defRPr>
-            </a:lvl1pPr>
-            <a:lvl2pPr marL="457200" algn="l" defTabSz="914400" rtl="0" eaLnBrk="1" latinLnBrk="0" hangingPunct="1">
-              <a:defRPr sz="1800" kern="1200">
-                <a:solidFill>
-                  <a:schemeClr val="dk1"/>
-                </a:solidFill>
-                <a:latin typeface="+mn-lt"/>
-                <a:ea typeface="+mn-ea"/>
-                <a:cs typeface="+mn-cs"/>
-              </a:defRPr>
-            </a:lvl2pPr>
-            <a:lvl3pPr marL="914400" algn="l" defTabSz="914400" rtl="0" eaLnBrk="1" latinLnBrk="0" hangingPunct="1">
-              <a:defRPr sz="1800" kern="1200">
-                <a:solidFill>
-                  <a:schemeClr val="dk1"/>
-                </a:solidFill>
-                <a:latin typeface="+mn-lt"/>
-                <a:ea typeface="+mn-ea"/>
-                <a:cs typeface="+mn-cs"/>
-              </a:defRPr>
-            </a:lvl3pPr>
-            <a:lvl4pPr marL="1371600" algn="l" defTabSz="914400" rtl="0" eaLnBrk="1" latinLnBrk="0" hangingPunct="1">
-              <a:defRPr sz="1800" kern="1200">
-                <a:solidFill>
-                  <a:schemeClr val="dk1"/>
-                </a:solidFill>
-                <a:latin typeface="+mn-lt"/>
-                <a:ea typeface="+mn-ea"/>
-                <a:cs typeface="+mn-cs"/>
-              </a:defRPr>
-            </a:lvl4pPr>
-            <a:lvl5pPr marL="1828800" algn="l" defTabSz="914400" rtl="0" eaLnBrk="1" latinLnBrk="0" hangingPunct="1">
-              <a:defRPr sz="1800" kern="1200">
-                <a:solidFill>
-                  <a:schemeClr val="dk1"/>
-                </a:solidFill>
-                <a:latin typeface="+mn-lt"/>
-                <a:ea typeface="+mn-ea"/>
-                <a:cs typeface="+mn-cs"/>
-              </a:defRPr>
-            </a:lvl5pPr>
-            <a:lvl6pPr marL="2286000" algn="l" defTabSz="914400" rtl="0" eaLnBrk="1" latinLnBrk="0" hangingPunct="1">
-              <a:defRPr sz="1800" kern="1200">
-                <a:solidFill>
-                  <a:schemeClr val="dk1"/>
-                </a:solidFill>
-                <a:latin typeface="+mn-lt"/>
-                <a:ea typeface="+mn-ea"/>
-                <a:cs typeface="+mn-cs"/>
-              </a:defRPr>
-            </a:lvl6pPr>
-            <a:lvl7pPr marL="2743200" algn="l" defTabSz="914400" rtl="0" eaLnBrk="1" latinLnBrk="0" hangingPunct="1">
-              <a:defRPr sz="1800" kern="1200">
-                <a:solidFill>
-                  <a:schemeClr val="dk1"/>
-                </a:solidFill>
-                <a:latin typeface="+mn-lt"/>
-                <a:ea typeface="+mn-ea"/>
-                <a:cs typeface="+mn-cs"/>
-              </a:defRPr>
-            </a:lvl7pPr>
-            <a:lvl8pPr marL="3200400" algn="l" defTabSz="914400" rtl="0" eaLnBrk="1" latinLnBrk="0" hangingPunct="1">
-              <a:defRPr sz="1800" kern="1200">
-                <a:solidFill>
-                  <a:schemeClr val="dk1"/>
-                </a:solidFill>
-                <a:latin typeface="+mn-lt"/>
-                <a:ea typeface="+mn-ea"/>
-                <a:cs typeface="+mn-cs"/>
-              </a:defRPr>
-            </a:lvl8pPr>
-            <a:lvl9pPr marL="3657600" algn="l" defTabSz="914400" rtl="0" eaLnBrk="1" latinLnBrk="0" hangingPunct="1">
-              <a:defRPr sz="1800" kern="1200">
-                <a:solidFill>
-                  <a:schemeClr val="dk1"/>
-                </a:solidFill>
-                <a:latin typeface="+mn-lt"/>
-                <a:ea typeface="+mn-ea"/>
-                <a:cs typeface="+mn-cs"/>
-              </a:defRPr>
-            </a:lvl9pPr>
-          </a:lstStyle>
+          <a:lstStyle/>
           <a:p>
             <a:pPr algn="ctr"/>
             <a:r>
@@ -6032,7 +6330,7 @@
                   <a:srgbClr val="7030A0"/>
                 </a:solidFill>
               </a:rPr>
-              <a:t>Name</a:t>
+              <a:t>Task</a:t>
             </a:r>
             <a:endParaRPr lang="en-SG" sz="1050" dirty="0">
               <a:solidFill>
@@ -6044,14 +6342,14 @@
       </p:sp>
       <p:sp>
         <p:nvSpPr>
-          <p:cNvPr id="73" name="Rectangle 8"/>
+          <p:cNvPr id="132" name="Rectangle 8"/>
           <p:cNvSpPr/>
           <p:nvPr/>
         </p:nvSpPr>
         <p:spPr>
           <a:xfrm>
-            <a:off x="6400800" y="5562600"/>
-            <a:ext cx="708186" cy="285783"/>
+            <a:off x="4200525" y="4648200"/>
+            <a:ext cx="990600" cy="381000"/>
           </a:xfrm>
           <a:prstGeom prst="rect">
             <a:avLst/>
@@ -6083,12 +6381,27 @@
           <a:p>
             <a:pPr algn="ctr"/>
             <a:r>
-              <a:rPr lang="en-US" altLang="zh-CN" sz="1050" dirty="0" smtClean="0">
+              <a:rPr lang="en-US" sz="1050" dirty="0" smtClean="0">
                 <a:solidFill>
                   <a:srgbClr val="7030A0"/>
                 </a:solidFill>
               </a:rPr>
-              <a:t>Favorite</a:t>
+              <a:t>&lt;&lt;interface&gt;&gt;</a:t>
+            </a:r>
+            <a:br>
+              <a:rPr lang="en-US" sz="1050" dirty="0" smtClean="0">
+                <a:solidFill>
+                  <a:srgbClr val="7030A0"/>
+                </a:solidFill>
+              </a:rPr>
+            </a:br>
+            <a:r>
+              <a:rPr lang="en-US" sz="1050" dirty="0" smtClean="0">
+                <a:solidFill>
+                  <a:srgbClr val="7030A0"/>
+                </a:solidFill>
+              </a:rPr>
+              <a:t>TaskField</a:t>
             </a:r>
             <a:endParaRPr lang="en-SG" sz="1050" dirty="0">
               <a:solidFill>
@@ -6098,415 +6411,19 @@
           </a:p>
         </p:txBody>
       </p:sp>
-      <p:sp>
-        <p:nvSpPr>
-          <p:cNvPr id="90" name="Rectangle 8"/>
-          <p:cNvSpPr/>
-          <p:nvPr/>
-        </p:nvSpPr>
-        <p:spPr>
-          <a:xfrm>
-            <a:off x="7391400" y="5562600"/>
-            <a:ext cx="708186" cy="285783"/>
-          </a:xfrm>
-          <a:prstGeom prst="rect">
-            <a:avLst/>
-          </a:prstGeom>
-          <a:ln w="19050">
-            <a:solidFill>
-              <a:srgbClr val="7030A0"/>
-            </a:solidFill>
-          </a:ln>
-          <a:effectLst/>
-        </p:spPr>
-        <p:style>
-          <a:lnRef idx="1">
-            <a:schemeClr val="accent4"/>
-          </a:lnRef>
-          <a:fillRef idx="2">
-            <a:schemeClr val="accent4"/>
-          </a:fillRef>
-          <a:effectRef idx="1">
-            <a:schemeClr val="accent4"/>
-          </a:effectRef>
-          <a:fontRef idx="minor">
-            <a:schemeClr val="dk1"/>
-          </a:fontRef>
-        </p:style>
-        <p:txBody>
-          <a:bodyPr rtlCol="0" anchor="ctr"/>
-          <a:lstStyle/>
-          <a:p>
-            <a:pPr algn="ctr"/>
-            <a:r>
-              <a:rPr lang="en-US" altLang="zh-CN" sz="1050" dirty="0" smtClean="0">
-                <a:solidFill>
-                  <a:srgbClr val="7030A0"/>
-                </a:solidFill>
-              </a:rPr>
-              <a:t>Finished</a:t>
-            </a:r>
-            <a:endParaRPr lang="en-SG" sz="1050" dirty="0">
-              <a:solidFill>
-                <a:srgbClr val="7030A0"/>
-              </a:solidFill>
-            </a:endParaRPr>
-          </a:p>
-        </p:txBody>
-      </p:sp>
-      <p:cxnSp>
-        <p:nvCxnSpPr>
-          <p:cNvPr id="93" name="Elbow Connector 92"/>
-          <p:cNvCxnSpPr/>
-          <p:nvPr/>
-        </p:nvCxnSpPr>
-        <p:spPr>
-          <a:xfrm rot="5400000">
-            <a:off x="4717847" y="2828411"/>
-            <a:ext cx="1292942" cy="975036"/>
-          </a:xfrm>
-          <a:prstGeom prst="bentConnector3">
-            <a:avLst>
-              <a:gd name="adj1" fmla="val 50000"/>
-            </a:avLst>
-          </a:prstGeom>
-          <a:ln w="19050">
-            <a:solidFill>
-              <a:srgbClr val="7030A0"/>
-            </a:solidFill>
-            <a:headEnd type="none" w="med" len="med"/>
-            <a:tailEnd type="arrow" w="med" len="med"/>
-          </a:ln>
-          <a:effectLst/>
-        </p:spPr>
-        <p:style>
-          <a:lnRef idx="1">
-            <a:schemeClr val="accent2"/>
-          </a:lnRef>
-          <a:fillRef idx="2">
-            <a:schemeClr val="accent2"/>
-          </a:fillRef>
-          <a:effectRef idx="1">
-            <a:schemeClr val="accent2"/>
-          </a:effectRef>
-          <a:fontRef idx="minor">
-            <a:schemeClr val="dk1"/>
-          </a:fontRef>
-        </p:style>
-      </p:cxnSp>
-      <p:sp>
-        <p:nvSpPr>
-          <p:cNvPr id="94" name="TextBox 93"/>
-          <p:cNvSpPr txBox="1"/>
-          <p:nvPr/>
-        </p:nvSpPr>
-        <p:spPr>
-          <a:xfrm>
-            <a:off x="5029200" y="3810000"/>
-            <a:ext cx="189257" cy="178683"/>
-          </a:xfrm>
-          <a:prstGeom prst="rect">
-            <a:avLst/>
-          </a:prstGeom>
-          <a:noFill/>
-        </p:spPr>
-        <p:txBody>
-          <a:bodyPr wrap="square" lIns="0" tIns="0" rIns="0" bIns="0" rtlCol="0">
-            <a:noAutofit/>
-          </a:bodyPr>
-          <a:lstStyle/>
-          <a:p>
-            <a:pPr algn="ctr"/>
-            <a:r>
-              <a:rPr lang="zh-CN" altLang="en-US" sz="1100" dirty="0">
-                <a:solidFill>
-                  <a:srgbClr val="7030A0"/>
-                </a:solidFill>
-              </a:rPr>
-              <a:t>*</a:t>
-            </a:r>
-            <a:endParaRPr lang="en-SG" sz="1100" dirty="0">
-              <a:solidFill>
-                <a:srgbClr val="7030A0"/>
-              </a:solidFill>
-            </a:endParaRPr>
-          </a:p>
-        </p:txBody>
-      </p:sp>
-      <p:sp>
-        <p:nvSpPr>
-          <p:cNvPr id="89" name="Rectangle 8"/>
-          <p:cNvSpPr/>
-          <p:nvPr/>
-        </p:nvSpPr>
-        <p:spPr>
-          <a:xfrm>
-            <a:off x="6477000" y="2057400"/>
-            <a:ext cx="1135778" cy="346760"/>
-          </a:xfrm>
-          <a:prstGeom prst="rect">
-            <a:avLst/>
-          </a:prstGeom>
-          <a:ln w="19050">
-            <a:solidFill>
-              <a:srgbClr val="7030A0"/>
-            </a:solidFill>
-          </a:ln>
-          <a:effectLst/>
-        </p:spPr>
-        <p:style>
-          <a:lnRef idx="1">
-            <a:schemeClr val="accent4"/>
-          </a:lnRef>
-          <a:fillRef idx="2">
-            <a:schemeClr val="accent4"/>
-          </a:fillRef>
-          <a:effectRef idx="1">
-            <a:schemeClr val="accent4"/>
-          </a:effectRef>
-          <a:fontRef idx="minor">
-            <a:schemeClr val="dk1"/>
-          </a:fontRef>
-        </p:style>
-        <p:txBody>
-          <a:bodyPr rtlCol="0" anchor="ctr"/>
-          <a:lstStyle/>
-          <a:p>
-            <a:pPr algn="ctr"/>
-            <a:r>
-              <a:rPr lang="en-US" sz="1050" dirty="0" smtClean="0">
-                <a:solidFill>
-                  <a:srgbClr val="7030A0"/>
-                </a:solidFill>
-              </a:rPr>
-              <a:t>&lt;&lt;interface&gt;&gt;</a:t>
-            </a:r>
-            <a:br>
-              <a:rPr lang="en-US" sz="1050" dirty="0" smtClean="0">
-                <a:solidFill>
-                  <a:srgbClr val="7030A0"/>
-                </a:solidFill>
-              </a:rPr>
-            </a:br>
-            <a:r>
-              <a:rPr lang="en-US" sz="1050" dirty="0" err="1" smtClean="0">
-                <a:solidFill>
-                  <a:srgbClr val="7030A0"/>
-                </a:solidFill>
-              </a:rPr>
-              <a:t>ReadOnly</a:t>
-            </a:r>
-            <a:r>
-              <a:rPr lang="en-US" altLang="zh-CN" sz="1050" dirty="0" err="1" smtClean="0">
-                <a:solidFill>
-                  <a:srgbClr val="7030A0"/>
-                </a:solidFill>
-              </a:rPr>
-              <a:t>Event</a:t>
-            </a:r>
-            <a:endParaRPr lang="en-SG" sz="1050" dirty="0">
-              <a:solidFill>
-                <a:srgbClr val="7030A0"/>
-              </a:solidFill>
-            </a:endParaRPr>
-          </a:p>
-        </p:txBody>
-      </p:sp>
-      <p:sp>
-        <p:nvSpPr>
-          <p:cNvPr id="101" name="Rectangle 8"/>
-          <p:cNvSpPr/>
-          <p:nvPr/>
-        </p:nvSpPr>
-        <p:spPr>
-          <a:xfrm>
-            <a:off x="6781800" y="2895600"/>
-            <a:ext cx="708186" cy="346760"/>
-          </a:xfrm>
-          <a:prstGeom prst="rect">
-            <a:avLst/>
-          </a:prstGeom>
-          <a:ln w="19050">
-            <a:solidFill>
-              <a:srgbClr val="7030A0"/>
-            </a:solidFill>
-          </a:ln>
-          <a:effectLst/>
-        </p:spPr>
-        <p:style>
-          <a:lnRef idx="1">
-            <a:schemeClr val="accent4"/>
-          </a:lnRef>
-          <a:fillRef idx="2">
-            <a:schemeClr val="accent4"/>
-          </a:fillRef>
-          <a:effectRef idx="1">
-            <a:schemeClr val="accent4"/>
-          </a:effectRef>
-          <a:fontRef idx="minor">
-            <a:schemeClr val="dk1"/>
-          </a:fontRef>
-        </p:style>
-        <p:txBody>
-          <a:bodyPr rtlCol="0" anchor="ctr"/>
-          <a:lstStyle/>
-          <a:p>
-            <a:pPr algn="ctr"/>
-            <a:r>
-              <a:rPr lang="en-US" altLang="zh-CN" sz="1050" dirty="0" smtClean="0">
-                <a:solidFill>
-                  <a:srgbClr val="7030A0"/>
-                </a:solidFill>
-              </a:rPr>
-              <a:t>Event</a:t>
-            </a:r>
-            <a:endParaRPr lang="en-SG" sz="1050" dirty="0">
-              <a:solidFill>
-                <a:srgbClr val="7030A0"/>
-              </a:solidFill>
-            </a:endParaRPr>
-          </a:p>
-        </p:txBody>
-      </p:sp>
-      <p:sp>
-        <p:nvSpPr>
-          <p:cNvPr id="104" name="Rectangle 8"/>
-          <p:cNvSpPr/>
-          <p:nvPr/>
-        </p:nvSpPr>
-        <p:spPr>
-          <a:xfrm>
-            <a:off x="4343400" y="3962400"/>
-            <a:ext cx="708186" cy="346760"/>
-          </a:xfrm>
-          <a:prstGeom prst="rect">
-            <a:avLst/>
-          </a:prstGeom>
-          <a:ln w="19050">
-            <a:solidFill>
-              <a:srgbClr val="7030A0"/>
-            </a:solidFill>
-          </a:ln>
-          <a:effectLst/>
-        </p:spPr>
-        <p:style>
-          <a:lnRef idx="1">
-            <a:schemeClr val="accent4"/>
-          </a:lnRef>
-          <a:fillRef idx="2">
-            <a:schemeClr val="accent4"/>
-          </a:fillRef>
-          <a:effectRef idx="1">
-            <a:schemeClr val="accent4"/>
-          </a:effectRef>
-          <a:fontRef idx="minor">
-            <a:schemeClr val="dk1"/>
-          </a:fontRef>
-        </p:style>
-        <p:txBody>
-          <a:bodyPr rtlCol="0" anchor="ctr"/>
-          <a:lstStyle/>
-          <a:p>
-            <a:pPr algn="ctr"/>
-            <a:r>
-              <a:rPr lang="en-US" altLang="zh-CN" sz="1050" dirty="0" smtClean="0">
-                <a:solidFill>
-                  <a:srgbClr val="7030A0"/>
-                </a:solidFill>
-              </a:rPr>
-              <a:t>Task</a:t>
-            </a:r>
-            <a:endParaRPr lang="en-SG" sz="1050" dirty="0">
-              <a:solidFill>
-                <a:srgbClr val="7030A0"/>
-              </a:solidFill>
-            </a:endParaRPr>
-          </a:p>
-        </p:txBody>
-      </p:sp>
-      <p:sp>
-        <p:nvSpPr>
-          <p:cNvPr id="132" name="Rectangle 8"/>
-          <p:cNvSpPr/>
-          <p:nvPr/>
-        </p:nvSpPr>
-        <p:spPr>
-          <a:xfrm>
-            <a:off x="4200525" y="4648200"/>
-            <a:ext cx="990600" cy="381000"/>
-          </a:xfrm>
-          <a:prstGeom prst="rect">
-            <a:avLst/>
-          </a:prstGeom>
-          <a:ln w="19050">
-            <a:solidFill>
-              <a:srgbClr val="7030A0"/>
-            </a:solidFill>
-          </a:ln>
-          <a:effectLst/>
-        </p:spPr>
-        <p:style>
-          <a:lnRef idx="1">
-            <a:schemeClr val="accent4"/>
-          </a:lnRef>
-          <a:fillRef idx="2">
-            <a:schemeClr val="accent4"/>
-          </a:fillRef>
-          <a:effectRef idx="1">
-            <a:schemeClr val="accent4"/>
-          </a:effectRef>
-          <a:fontRef idx="minor">
-            <a:schemeClr val="dk1"/>
-          </a:fontRef>
-        </p:style>
-        <p:txBody>
-          <a:bodyPr rtlCol="0" anchor="ctr"/>
-          <a:lstStyle/>
-          <a:p>
-            <a:pPr algn="ctr"/>
-            <a:r>
-              <a:rPr lang="en-US" sz="1050" dirty="0" smtClean="0">
-                <a:solidFill>
-                  <a:srgbClr val="7030A0"/>
-                </a:solidFill>
-              </a:rPr>
-              <a:t>&lt;&lt;interface&gt;&gt;</a:t>
-            </a:r>
-            <a:br>
-              <a:rPr lang="en-US" sz="1050" dirty="0" smtClean="0">
-                <a:solidFill>
-                  <a:srgbClr val="7030A0"/>
-                </a:solidFill>
-              </a:rPr>
-            </a:br>
-            <a:r>
-              <a:rPr lang="en-US" sz="1050" dirty="0" smtClean="0">
-                <a:solidFill>
-                  <a:srgbClr val="7030A0"/>
-                </a:solidFill>
-              </a:rPr>
-              <a:t>TaskField</a:t>
-            </a:r>
-            <a:endParaRPr lang="en-SG" sz="1050" dirty="0">
-              <a:solidFill>
-                <a:srgbClr val="7030A0"/>
-              </a:solidFill>
-            </a:endParaRPr>
-          </a:p>
-        </p:txBody>
-      </p:sp>
       <p:cxnSp>
         <p:nvCxnSpPr>
           <p:cNvPr id="194" name="Elbow Connector 63"/>
           <p:cNvCxnSpPr>
             <a:stCxn id="195" idx="3"/>
+            <a:endCxn id="101" idx="1"/>
           </p:cNvCxnSpPr>
           <p:nvPr/>
         </p:nvCxnSpPr>
         <p:spPr>
-          <a:xfrm rot="16200000" flipH="1">
-            <a:off x="6998740" y="2732259"/>
-            <a:ext cx="293825" cy="1"/>
+          <a:xfrm flipV="1">
+            <a:off x="7274056" y="3111862"/>
+            <a:ext cx="453462" cy="1929"/>
           </a:xfrm>
           <a:prstGeom prst="bentConnector3">
             <a:avLst>
@@ -6545,8 +6462,8 @@
           <p:nvPr/>
         </p:nvSpPr>
         <p:spPr>
-          <a:xfrm rot="10800000" flipV="1">
-            <a:off x="7010400" y="2409825"/>
+          <a:xfrm rot="5295786" flipV="1">
+            <a:off x="7051083" y="3028690"/>
             <a:ext cx="270504" cy="175523"/>
           </a:xfrm>
           <a:prstGeom prst="triangle">
@@ -6593,8 +6510,8 @@
           <p:nvPr/>
         </p:nvSpPr>
         <p:spPr>
-          <a:xfrm rot="5400000" flipV="1">
-            <a:off x="4991235" y="4019416"/>
+          <a:xfrm rot="10800000" flipV="1">
+            <a:off x="4781363" y="4318880"/>
             <a:ext cx="270504" cy="175523"/>
           </a:xfrm>
           <a:prstGeom prst="triangle">
@@ -6644,12 +6561,14 @@
           <p:nvPr/>
         </p:nvCxnSpPr>
         <p:spPr>
-          <a:xfrm flipV="1">
-            <a:off x="5214249" y="3242360"/>
-            <a:ext cx="1921644" cy="864818"/>
-          </a:xfrm>
-          <a:prstGeom prst="bentConnector2">
-            <a:avLst/>
+          <a:xfrm rot="5400000" flipH="1" flipV="1">
+            <a:off x="5894532" y="2307325"/>
+            <a:ext cx="1209161" cy="3164996"/>
+          </a:xfrm>
+          <a:prstGeom prst="bentConnector3">
+            <a:avLst>
+              <a:gd name="adj1" fmla="val -8319"/>
+            </a:avLst>
           </a:prstGeom>
           <a:ln w="19050">
             <a:solidFill>
@@ -7116,10 +7035,362 @@
           </a:fontRef>
         </p:style>
       </p:cxnSp>
+      <p:sp>
+        <p:nvSpPr>
+          <p:cNvPr id="113" name="Isosceles Triangle 102"/>
+          <p:cNvSpPr/>
+          <p:nvPr/>
+        </p:nvSpPr>
+        <p:spPr>
+          <a:xfrm rot="5295786" flipV="1">
+            <a:off x="7082898" y="3995178"/>
+            <a:ext cx="270504" cy="175523"/>
+          </a:xfrm>
+          <a:prstGeom prst="triangle">
+            <a:avLst/>
+          </a:prstGeom>
+          <a:ln w="19050">
+            <a:solidFill>
+              <a:srgbClr val="7030A0"/>
+            </a:solidFill>
+          </a:ln>
+          <a:effectLst/>
+        </p:spPr>
+        <p:style>
+          <a:lnRef idx="1">
+            <a:schemeClr val="accent4"/>
+          </a:lnRef>
+          <a:fillRef idx="2">
+            <a:schemeClr val="accent4"/>
+          </a:fillRef>
+          <a:effectRef idx="1">
+            <a:schemeClr val="accent4"/>
+          </a:effectRef>
+          <a:fontRef idx="minor">
+            <a:schemeClr val="dk1"/>
+          </a:fontRef>
+        </p:style>
+        <p:txBody>
+          <a:bodyPr rtlCol="0" anchor="ctr"/>
+          <a:lstStyle/>
+          <a:p>
+            <a:pPr algn="ctr"/>
+            <a:endParaRPr lang="en-SG" sz="1050" b="1">
+              <a:solidFill>
+                <a:srgbClr val="92D050"/>
+              </a:solidFill>
+            </a:endParaRPr>
+          </a:p>
+        </p:txBody>
+      </p:sp>
+      <p:cxnSp>
+        <p:nvCxnSpPr>
+          <p:cNvPr id="115" name="Elbow Connector 63"/>
+          <p:cNvCxnSpPr/>
+          <p:nvPr/>
+        </p:nvCxnSpPr>
+        <p:spPr>
+          <a:xfrm rot="5400000" flipH="1" flipV="1">
+            <a:off x="7223898" y="3382038"/>
+            <a:ext cx="786975" cy="614829"/>
+          </a:xfrm>
+          <a:prstGeom prst="bentConnector3">
+            <a:avLst>
+              <a:gd name="adj1" fmla="val -1124"/>
+            </a:avLst>
+          </a:prstGeom>
+          <a:ln w="19050">
+            <a:solidFill>
+              <a:srgbClr val="7030A0"/>
+            </a:solidFill>
+            <a:prstDash val="sysDot"/>
+            <a:headEnd type="none" w="med" len="med"/>
+            <a:tailEnd type="none" w="med" len="med"/>
+          </a:ln>
+          <a:effectLst/>
+        </p:spPr>
+        <p:style>
+          <a:lnRef idx="1">
+            <a:schemeClr val="accent2"/>
+          </a:lnRef>
+          <a:fillRef idx="2">
+            <a:schemeClr val="accent2"/>
+          </a:fillRef>
+          <a:effectRef idx="1">
+            <a:schemeClr val="accent2"/>
+          </a:effectRef>
+          <a:fontRef idx="minor">
+            <a:schemeClr val="dk1"/>
+          </a:fontRef>
+        </p:style>
+      </p:cxnSp>
+      <p:sp>
+        <p:nvSpPr>
+          <p:cNvPr id="121" name="Isosceles Triangle 102"/>
+          <p:cNvSpPr/>
+          <p:nvPr/>
+        </p:nvSpPr>
+        <p:spPr>
+          <a:xfrm rot="16200000" flipV="1">
+            <a:off x="5735326" y="4033305"/>
+            <a:ext cx="270504" cy="175523"/>
+          </a:xfrm>
+          <a:prstGeom prst="triangle">
+            <a:avLst/>
+          </a:prstGeom>
+          <a:ln w="19050">
+            <a:solidFill>
+              <a:srgbClr val="7030A0"/>
+            </a:solidFill>
+          </a:ln>
+          <a:effectLst/>
+        </p:spPr>
+        <p:style>
+          <a:lnRef idx="1">
+            <a:schemeClr val="accent4"/>
+          </a:lnRef>
+          <a:fillRef idx="2">
+            <a:schemeClr val="accent4"/>
+          </a:fillRef>
+          <a:effectRef idx="1">
+            <a:schemeClr val="accent4"/>
+          </a:effectRef>
+          <a:fontRef idx="minor">
+            <a:schemeClr val="dk1"/>
+          </a:fontRef>
+        </p:style>
+        <p:txBody>
+          <a:bodyPr rtlCol="0" anchor="ctr"/>
+          <a:lstStyle/>
+          <a:p>
+            <a:pPr algn="ctr"/>
+            <a:endParaRPr lang="en-SG" sz="1050" b="1">
+              <a:solidFill>
+                <a:srgbClr val="92D050"/>
+              </a:solidFill>
+            </a:endParaRPr>
+          </a:p>
+        </p:txBody>
+      </p:sp>
+      <p:cxnSp>
+        <p:nvCxnSpPr>
+          <p:cNvPr id="131" name="Elbow Connector 63"/>
+          <p:cNvCxnSpPr>
+            <a:stCxn id="71" idx="3"/>
+            <a:endCxn id="89" idx="2"/>
+          </p:cNvCxnSpPr>
+          <p:nvPr/>
+        </p:nvCxnSpPr>
+        <p:spPr>
+          <a:xfrm rot="16200000" flipV="1">
+            <a:off x="6311468" y="3489283"/>
+            <a:ext cx="467629" cy="38105"/>
+          </a:xfrm>
+          <a:prstGeom prst="bentConnector3">
+            <a:avLst>
+              <a:gd name="adj1" fmla="val 102796"/>
+            </a:avLst>
+          </a:prstGeom>
+          <a:ln w="19050">
+            <a:solidFill>
+              <a:srgbClr val="7030A0"/>
+            </a:solidFill>
+            <a:prstDash val="sysDot"/>
+            <a:headEnd type="none" w="med" len="med"/>
+            <a:tailEnd type="none" w="med" len="med"/>
+          </a:ln>
+          <a:effectLst/>
+        </p:spPr>
+        <p:style>
+          <a:lnRef idx="1">
+            <a:schemeClr val="accent2"/>
+          </a:lnRef>
+          <a:fillRef idx="2">
+            <a:schemeClr val="accent2"/>
+          </a:fillRef>
+          <a:effectRef idx="1">
+            <a:schemeClr val="accent2"/>
+          </a:effectRef>
+          <a:fontRef idx="minor">
+            <a:schemeClr val="dk1"/>
+          </a:fontRef>
+        </p:style>
+      </p:cxnSp>
+      <p:cxnSp>
+        <p:nvCxnSpPr>
+          <p:cNvPr id="135" name="Elbow Connector 63"/>
+          <p:cNvCxnSpPr/>
+          <p:nvPr/>
+        </p:nvCxnSpPr>
+        <p:spPr>
+          <a:xfrm>
+            <a:off x="5046779" y="4122950"/>
+            <a:ext cx="707312" cy="991"/>
+          </a:xfrm>
+          <a:prstGeom prst="bentConnector3">
+            <a:avLst>
+              <a:gd name="adj1" fmla="val 50000"/>
+            </a:avLst>
+          </a:prstGeom>
+          <a:ln w="19050">
+            <a:solidFill>
+              <a:srgbClr val="7030A0"/>
+            </a:solidFill>
+            <a:prstDash val="sysDot"/>
+            <a:headEnd type="none" w="med" len="med"/>
+            <a:tailEnd type="none" w="med" len="med"/>
+          </a:ln>
+          <a:effectLst/>
+        </p:spPr>
+        <p:style>
+          <a:lnRef idx="1">
+            <a:schemeClr val="accent2"/>
+          </a:lnRef>
+          <a:fillRef idx="2">
+            <a:schemeClr val="accent2"/>
+          </a:fillRef>
+          <a:effectRef idx="1">
+            <a:schemeClr val="accent2"/>
+          </a:effectRef>
+          <a:fontRef idx="minor">
+            <a:schemeClr val="dk1"/>
+          </a:fontRef>
+        </p:style>
+      </p:cxnSp>
+      <p:sp>
+        <p:nvSpPr>
+          <p:cNvPr id="138" name="Isosceles Triangle 102"/>
+          <p:cNvSpPr/>
+          <p:nvPr/>
+        </p:nvSpPr>
+        <p:spPr>
+          <a:xfrm rot="5400000" flipV="1">
+            <a:off x="5143635" y="4753403"/>
+            <a:ext cx="270504" cy="175523"/>
+          </a:xfrm>
+          <a:prstGeom prst="triangle">
+            <a:avLst/>
+          </a:prstGeom>
+          <a:ln w="19050">
+            <a:solidFill>
+              <a:srgbClr val="7030A0"/>
+            </a:solidFill>
+          </a:ln>
+          <a:effectLst/>
+        </p:spPr>
+        <p:style>
+          <a:lnRef idx="1">
+            <a:schemeClr val="accent4"/>
+          </a:lnRef>
+          <a:fillRef idx="2">
+            <a:schemeClr val="accent4"/>
+          </a:fillRef>
+          <a:effectRef idx="1">
+            <a:schemeClr val="accent4"/>
+          </a:effectRef>
+          <a:fontRef idx="minor">
+            <a:schemeClr val="dk1"/>
+          </a:fontRef>
+        </p:style>
+        <p:txBody>
+          <a:bodyPr rtlCol="0" anchor="ctr"/>
+          <a:lstStyle/>
+          <a:p>
+            <a:pPr algn="ctr"/>
+            <a:endParaRPr lang="en-SG" sz="1050" b="1">
+              <a:solidFill>
+                <a:srgbClr val="92D050"/>
+              </a:solidFill>
+            </a:endParaRPr>
+          </a:p>
+        </p:txBody>
+      </p:sp>
+      <p:cxnSp>
+        <p:nvCxnSpPr>
+          <p:cNvPr id="139" name="Elbow Connector 63"/>
+          <p:cNvCxnSpPr>
+            <a:endCxn id="67" idx="3"/>
+          </p:cNvCxnSpPr>
+          <p:nvPr/>
+        </p:nvCxnSpPr>
+        <p:spPr>
+          <a:xfrm rot="16200000" flipV="1">
+            <a:off x="3970840" y="3194414"/>
+            <a:ext cx="2678187" cy="610385"/>
+          </a:xfrm>
+          <a:prstGeom prst="bentConnector2">
+            <a:avLst/>
+          </a:prstGeom>
+          <a:ln w="19050">
+            <a:solidFill>
+              <a:srgbClr val="7030A0"/>
+            </a:solidFill>
+            <a:prstDash val="sysDot"/>
+            <a:headEnd type="none" w="med" len="med"/>
+            <a:tailEnd type="none" w="med" len="med"/>
+          </a:ln>
+          <a:effectLst/>
+        </p:spPr>
+        <p:style>
+          <a:lnRef idx="1">
+            <a:schemeClr val="accent2"/>
+          </a:lnRef>
+          <a:fillRef idx="2">
+            <a:schemeClr val="accent2"/>
+          </a:fillRef>
+          <a:effectRef idx="1">
+            <a:schemeClr val="accent2"/>
+          </a:effectRef>
+          <a:fontRef idx="minor">
+            <a:schemeClr val="dk1"/>
+          </a:fontRef>
+        </p:style>
+      </p:cxnSp>
+      <p:cxnSp>
+        <p:nvCxnSpPr>
+          <p:cNvPr id="143" name="Elbow Connector 63"/>
+          <p:cNvCxnSpPr/>
+          <p:nvPr/>
+        </p:nvCxnSpPr>
+        <p:spPr>
+          <a:xfrm flipV="1">
+            <a:off x="5374906" y="4849421"/>
+            <a:ext cx="240220" cy="11004"/>
+          </a:xfrm>
+          <a:prstGeom prst="bentConnector3">
+            <a:avLst>
+              <a:gd name="adj1" fmla="val 50000"/>
+            </a:avLst>
+          </a:prstGeom>
+          <a:ln w="19050">
+            <a:solidFill>
+              <a:srgbClr val="7030A0"/>
+            </a:solidFill>
+            <a:prstDash val="sysDot"/>
+            <a:headEnd type="none" w="med" len="med"/>
+            <a:tailEnd type="none" w="med" len="med"/>
+          </a:ln>
+          <a:effectLst/>
+        </p:spPr>
+        <p:style>
+          <a:lnRef idx="1">
+            <a:schemeClr val="accent2"/>
+          </a:lnRef>
+          <a:fillRef idx="2">
+            <a:schemeClr val="accent2"/>
+          </a:fillRef>
+          <a:effectRef idx="1">
+            <a:schemeClr val="accent2"/>
+          </a:effectRef>
+          <a:fontRef idx="minor">
+            <a:schemeClr val="dk1"/>
+          </a:fontRef>
+        </p:style>
+      </p:cxnSp>
     </p:spTree>
     <p:extLst>
       <p:ext uri="{BB962C8B-B14F-4D97-AF65-F5344CB8AC3E}">
-        <p14:creationId xmlns:p14="http://schemas.microsoft.com/office/powerpoint/2010/main" xmlns="" val="2396968029"/>
+        <p14:creationId xmlns:p14="http://schemas.microsoft.com/office/powerpoint/2010/main" val="2396968029"/>
       </p:ext>
     </p:extLst>
   </p:cSld>

</xml_diff>

<commit_message>
[Diagram] Change model diagram
</commit_message>
<xml_diff>
--- a/docs/diagrams/ModelComponentClassDiagram.pptx
+++ b/docs/diagrams/ModelComponentClassDiagram.pptx
@@ -209,7 +209,7 @@
             <a:fld id="{F5CC4B3F-88C1-4FFA-B1B6-F41C21DC6924}" type="datetimeFigureOut">
               <a:rPr lang="en-US" smtClean="0"/>
               <a:pPr/>
-              <a:t>3/27/17</a:t>
+              <a:t>3/28/17</a:t>
             </a:fld>
             <a:endParaRPr lang="en-US"/>
           </a:p>
@@ -478,6 +478,91 @@
 </p:notesMaster>
 </file>
 
+<file path=ppt/notesSlides/notesSlide1.xml><?xml version="1.0" encoding="utf-8"?>
+<p:notes xmlns:a="http://schemas.openxmlformats.org/drawingml/2006/main" xmlns:r="http://schemas.openxmlformats.org/officeDocument/2006/relationships" xmlns:p="http://schemas.openxmlformats.org/presentationml/2006/main">
+  <p:cSld>
+    <p:spTree>
+      <p:nvGrpSpPr>
+        <p:cNvPr id="1" name=""/>
+        <p:cNvGrpSpPr/>
+        <p:nvPr/>
+      </p:nvGrpSpPr>
+      <p:grpSpPr>
+        <a:xfrm>
+          <a:off x="0" y="0"/>
+          <a:ext cx="0" cy="0"/>
+          <a:chOff x="0" y="0"/>
+          <a:chExt cx="0" cy="0"/>
+        </a:xfrm>
+      </p:grpSpPr>
+      <p:sp>
+        <p:nvSpPr>
+          <p:cNvPr id="2" name="Slide Image Placeholder 1"/>
+          <p:cNvSpPr>
+            <a:spLocks noGrp="1" noRot="1" noChangeAspect="1"/>
+          </p:cNvSpPr>
+          <p:nvPr>
+            <p:ph type="sldImg"/>
+          </p:nvPr>
+        </p:nvSpPr>
+        <p:spPr/>
+      </p:sp>
+      <p:sp>
+        <p:nvSpPr>
+          <p:cNvPr id="3" name="Notes Placeholder 2"/>
+          <p:cNvSpPr>
+            <a:spLocks noGrp="1"/>
+          </p:cNvSpPr>
+          <p:nvPr>
+            <p:ph type="body" idx="1"/>
+          </p:nvPr>
+        </p:nvSpPr>
+        <p:spPr/>
+        <p:txBody>
+          <a:bodyPr/>
+          <a:lstStyle/>
+          <a:p>
+            <a:endParaRPr lang="en-US" dirty="0"/>
+          </a:p>
+        </p:txBody>
+      </p:sp>
+      <p:sp>
+        <p:nvSpPr>
+          <p:cNvPr id="4" name="Slide Number Placeholder 3"/>
+          <p:cNvSpPr>
+            <a:spLocks noGrp="1"/>
+          </p:cNvSpPr>
+          <p:nvPr>
+            <p:ph type="sldNum" sz="quarter" idx="10"/>
+          </p:nvPr>
+        </p:nvSpPr>
+        <p:spPr/>
+        <p:txBody>
+          <a:bodyPr/>
+          <a:lstStyle/>
+          <a:p>
+            <a:fld id="{5A7AB025-77E3-4BD1-A2FD-B3183DBA47A3}" type="slidenum">
+              <a:rPr lang="en-US" smtClean="0"/>
+              <a:pPr/>
+              <a:t>1</a:t>
+            </a:fld>
+            <a:endParaRPr lang="en-US"/>
+          </a:p>
+        </p:txBody>
+      </p:sp>
+    </p:spTree>
+    <p:extLst>
+      <p:ext uri="{BB962C8B-B14F-4D97-AF65-F5344CB8AC3E}">
+        <p14:creationId xmlns:p14="http://schemas.microsoft.com/office/powerpoint/2010/main" val="1600004159"/>
+      </p:ext>
+    </p:extLst>
+  </p:cSld>
+  <p:clrMapOvr>
+    <a:masterClrMapping/>
+  </p:clrMapOvr>
+</p:notes>
+</file>
+
 <file path=ppt/slideLayouts/slideLayout1.xml><?xml version="1.0" encoding="utf-8"?>
 <p:sldLayout xmlns:a="http://schemas.openxmlformats.org/drawingml/2006/main" xmlns:r="http://schemas.openxmlformats.org/officeDocument/2006/relationships" xmlns:p="http://schemas.openxmlformats.org/presentationml/2006/main" type="title" preserve="1">
   <p:cSld name="Title Slide">
@@ -660,7 +745,7 @@
             <a:fld id="{78C97017-6FC3-485B-9764-EAC9E56C1D49}" type="datetimeFigureOut">
               <a:rPr lang="en-US" smtClean="0"/>
               <a:pPr/>
-              <a:t>3/27/17</a:t>
+              <a:t>3/28/17</a:t>
             </a:fld>
             <a:endParaRPr lang="en-US"/>
           </a:p>
@@ -832,7 +917,7 @@
             <a:fld id="{78C97017-6FC3-485B-9764-EAC9E56C1D49}" type="datetimeFigureOut">
               <a:rPr lang="en-US" smtClean="0"/>
               <a:pPr/>
-              <a:t>3/27/17</a:t>
+              <a:t>3/28/17</a:t>
             </a:fld>
             <a:endParaRPr lang="en-US"/>
           </a:p>
@@ -1014,7 +1099,7 @@
             <a:fld id="{78C97017-6FC3-485B-9764-EAC9E56C1D49}" type="datetimeFigureOut">
               <a:rPr lang="en-US" smtClean="0"/>
               <a:pPr/>
-              <a:t>3/27/17</a:t>
+              <a:t>3/28/17</a:t>
             </a:fld>
             <a:endParaRPr lang="en-US"/>
           </a:p>
@@ -1186,7 +1271,7 @@
             <a:fld id="{78C97017-6FC3-485B-9764-EAC9E56C1D49}" type="datetimeFigureOut">
               <a:rPr lang="en-US" smtClean="0"/>
               <a:pPr/>
-              <a:t>3/27/17</a:t>
+              <a:t>3/28/17</a:t>
             </a:fld>
             <a:endParaRPr lang="en-US"/>
           </a:p>
@@ -1434,7 +1519,7 @@
             <a:fld id="{78C97017-6FC3-485B-9764-EAC9E56C1D49}" type="datetimeFigureOut">
               <a:rPr lang="en-US" smtClean="0"/>
               <a:pPr/>
-              <a:t>3/27/17</a:t>
+              <a:t>3/28/17</a:t>
             </a:fld>
             <a:endParaRPr lang="en-US"/>
           </a:p>
@@ -1724,7 +1809,7 @@
             <a:fld id="{78C97017-6FC3-485B-9764-EAC9E56C1D49}" type="datetimeFigureOut">
               <a:rPr lang="en-US" smtClean="0"/>
               <a:pPr/>
-              <a:t>3/27/17</a:t>
+              <a:t>3/28/17</a:t>
             </a:fld>
             <a:endParaRPr lang="en-US"/>
           </a:p>
@@ -2148,7 +2233,7 @@
             <a:fld id="{78C97017-6FC3-485B-9764-EAC9E56C1D49}" type="datetimeFigureOut">
               <a:rPr lang="en-US" smtClean="0"/>
               <a:pPr/>
-              <a:t>3/27/17</a:t>
+              <a:t>3/28/17</a:t>
             </a:fld>
             <a:endParaRPr lang="en-US"/>
           </a:p>
@@ -2268,7 +2353,7 @@
             <a:fld id="{78C97017-6FC3-485B-9764-EAC9E56C1D49}" type="datetimeFigureOut">
               <a:rPr lang="en-US" smtClean="0"/>
               <a:pPr/>
-              <a:t>3/27/17</a:t>
+              <a:t>3/28/17</a:t>
             </a:fld>
             <a:endParaRPr lang="en-US"/>
           </a:p>
@@ -2365,7 +2450,7 @@
             <a:fld id="{78C97017-6FC3-485B-9764-EAC9E56C1D49}" type="datetimeFigureOut">
               <a:rPr lang="en-US" smtClean="0"/>
               <a:pPr/>
-              <a:t>3/27/17</a:t>
+              <a:t>3/28/17</a:t>
             </a:fld>
             <a:endParaRPr lang="en-US"/>
           </a:p>
@@ -2644,7 +2729,7 @@
             <a:fld id="{78C97017-6FC3-485B-9764-EAC9E56C1D49}" type="datetimeFigureOut">
               <a:rPr lang="en-US" smtClean="0"/>
               <a:pPr/>
-              <a:t>3/27/17</a:t>
+              <a:t>3/28/17</a:t>
             </a:fld>
             <a:endParaRPr lang="en-US"/>
           </a:p>
@@ -2899,7 +2984,7 @@
             <a:fld id="{78C97017-6FC3-485B-9764-EAC9E56C1D49}" type="datetimeFigureOut">
               <a:rPr lang="en-US" smtClean="0"/>
               <a:pPr/>
-              <a:t>3/27/17</a:t>
+              <a:t>3/28/17</a:t>
             </a:fld>
             <a:endParaRPr lang="en-US"/>
           </a:p>
@@ -3114,7 +3199,7 @@
             <a:fld id="{78C97017-6FC3-485B-9764-EAC9E56C1D49}" type="datetimeFigureOut">
               <a:rPr lang="en-US" smtClean="0"/>
               <a:pPr/>
-              <a:t>3/27/17</a:t>
+              <a:t>3/28/17</a:t>
             </a:fld>
             <a:endParaRPr lang="en-US"/>
           </a:p>
@@ -3498,7 +3583,7 @@
         </p:nvSpPr>
         <p:spPr>
           <a:xfrm>
-            <a:off x="381000" y="1832423"/>
+            <a:off x="349644" y="1869427"/>
             <a:ext cx="8229600" cy="4114800"/>
           </a:xfrm>
           <a:prstGeom prst="roundRect">
@@ -4800,28 +4885,12 @@
           <a:p>
             <a:pPr algn="ctr"/>
             <a:r>
-              <a:rPr lang="en-US" altLang="zh-CN" sz="1050" dirty="0" smtClean="0">
+              <a:rPr lang="en-US" altLang="zh-CN" sz="1050" dirty="0" err="1" smtClean="0">
                 <a:solidFill>
                   <a:srgbClr val="7030A0"/>
                 </a:solidFill>
               </a:rPr>
-              <a:t>Due</a:t>
-            </a:r>
-            <a:r>
-              <a:rPr lang="zh-CN" altLang="en-US" sz="1050" dirty="0" smtClean="0">
-                <a:solidFill>
-                  <a:srgbClr val="7030A0"/>
-                </a:solidFill>
-              </a:rPr>
-              <a:t> </a:t>
-            </a:r>
-            <a:r>
-              <a:rPr lang="en-US" altLang="zh-CN" sz="1050" dirty="0" smtClean="0">
-                <a:solidFill>
-                  <a:srgbClr val="7030A0"/>
-                </a:solidFill>
-              </a:rPr>
-              <a:t>time</a:t>
+              <a:t>TaskTime</a:t>
             </a:r>
             <a:endParaRPr lang="en-SG" sz="1050" dirty="0">
               <a:solidFill>
@@ -5353,45 +5422,6 @@
       </p:sp>
       <p:sp>
         <p:nvSpPr>
-          <p:cNvPr id="56" name="TextBox 55"/>
-          <p:cNvSpPr txBox="1"/>
-          <p:nvPr/>
-        </p:nvSpPr>
-        <p:spPr>
-          <a:xfrm>
-            <a:off x="5006974" y="2201599"/>
-            <a:ext cx="189257" cy="178683"/>
-          </a:xfrm>
-          <a:prstGeom prst="rect">
-            <a:avLst/>
-          </a:prstGeom>
-          <a:noFill/>
-        </p:spPr>
-        <p:txBody>
-          <a:bodyPr wrap="square" lIns="0" tIns="0" rIns="0" bIns="0" rtlCol="0">
-            <a:noAutofit/>
-          </a:bodyPr>
-          <a:lstStyle/>
-          <a:p>
-            <a:pPr algn="ctr"/>
-            <a:r>
-              <a:rPr lang="en-US" sz="1100" dirty="0" smtClean="0">
-                <a:solidFill>
-                  <a:srgbClr val="7030A0"/>
-                </a:solidFill>
-              </a:rPr>
-              <a:t>1</a:t>
-            </a:r>
-            <a:endParaRPr lang="en-SG" sz="1100" dirty="0">
-              <a:solidFill>
-                <a:srgbClr val="7030A0"/>
-              </a:solidFill>
-            </a:endParaRPr>
-          </a:p>
-        </p:txBody>
-      </p:sp>
-      <p:sp>
-        <p:nvSpPr>
           <p:cNvPr id="60" name="TextBox 59"/>
           <p:cNvSpPr txBox="1"/>
           <p:nvPr/>
@@ -5776,28 +5806,12 @@
           <a:p>
             <a:pPr algn="ctr"/>
             <a:r>
-              <a:rPr lang="en-US" altLang="zh-CN" sz="1050" dirty="0" smtClean="0">
+              <a:rPr lang="en-US" altLang="zh-CN" sz="1050" dirty="0" err="1" smtClean="0">
                 <a:solidFill>
                   <a:srgbClr val="7030A0"/>
                 </a:solidFill>
               </a:rPr>
-              <a:t>Due</a:t>
-            </a:r>
-            <a:r>
-              <a:rPr lang="zh-CN" altLang="en-US" sz="1050" dirty="0" smtClean="0">
-                <a:solidFill>
-                  <a:srgbClr val="7030A0"/>
-                </a:solidFill>
-              </a:rPr>
-              <a:t> </a:t>
-            </a:r>
-            <a:r>
-              <a:rPr lang="en-US" altLang="zh-CN" sz="1050" dirty="0" smtClean="0">
-                <a:solidFill>
-                  <a:srgbClr val="7030A0"/>
-                </a:solidFill>
-              </a:rPr>
-              <a:t>date</a:t>
+              <a:t>TaskDate</a:t>
             </a:r>
             <a:endParaRPr lang="en-SG" sz="1050" dirty="0">
               <a:solidFill>
@@ -6069,47 +6083,6 @@
           </a:p>
         </p:txBody>
       </p:sp>
-      <p:cxnSp>
-        <p:nvCxnSpPr>
-          <p:cNvPr id="93" name="Elbow Connector 92"/>
-          <p:cNvCxnSpPr/>
-          <p:nvPr/>
-        </p:nvCxnSpPr>
-        <p:spPr>
-          <a:xfrm flipH="1">
-            <a:off x="4885557" y="2158993"/>
-            <a:ext cx="128525" cy="1822199"/>
-          </a:xfrm>
-          <a:prstGeom prst="bentConnector4">
-            <a:avLst>
-              <a:gd name="adj1" fmla="val -177864"/>
-              <a:gd name="adj2" fmla="val 84866"/>
-            </a:avLst>
-          </a:prstGeom>
-          <a:ln w="19050">
-            <a:solidFill>
-              <a:srgbClr val="7030A0"/>
-            </a:solidFill>
-            <a:headEnd type="none" w="med" len="med"/>
-            <a:tailEnd type="arrow" w="med" len="med"/>
-          </a:ln>
-          <a:effectLst/>
-        </p:spPr>
-        <p:style>
-          <a:lnRef idx="1">
-            <a:schemeClr val="accent2"/>
-          </a:lnRef>
-          <a:fillRef idx="2">
-            <a:schemeClr val="accent2"/>
-          </a:fillRef>
-          <a:effectRef idx="1">
-            <a:schemeClr val="accent2"/>
-          </a:effectRef>
-          <a:fontRef idx="minor">
-            <a:schemeClr val="dk1"/>
-          </a:fontRef>
-        </p:style>
-      </p:cxnSp>
       <p:sp>
         <p:nvSpPr>
           <p:cNvPr id="94" name="TextBox 93"/>
@@ -7037,13 +7010,13 @@
       </p:cxnSp>
       <p:sp>
         <p:nvSpPr>
-          <p:cNvPr id="113" name="Isosceles Triangle 102"/>
+          <p:cNvPr id="121" name="Isosceles Triangle 102"/>
           <p:cNvSpPr/>
           <p:nvPr/>
         </p:nvSpPr>
         <p:spPr>
-          <a:xfrm rot="5295786" flipV="1">
-            <a:off x="7082898" y="3995178"/>
+          <a:xfrm rot="16200000" flipV="1">
+            <a:off x="5735326" y="4033305"/>
             <a:ext cx="270504" cy="175523"/>
           </a:xfrm>
           <a:prstGeom prst="triangle">
@@ -7085,18 +7058,21 @@
       </p:sp>
       <p:cxnSp>
         <p:nvCxnSpPr>
-          <p:cNvPr id="115" name="Elbow Connector 63"/>
-          <p:cNvCxnSpPr/>
+          <p:cNvPr id="131" name="Elbow Connector 63"/>
+          <p:cNvCxnSpPr>
+            <a:stCxn id="71" idx="3"/>
+            <a:endCxn id="89" idx="2"/>
+          </p:cNvCxnSpPr>
           <p:nvPr/>
         </p:nvCxnSpPr>
         <p:spPr>
-          <a:xfrm rot="5400000" flipH="1" flipV="1">
-            <a:off x="7223898" y="3382038"/>
-            <a:ext cx="786975" cy="614829"/>
+          <a:xfrm rot="16200000" flipV="1">
+            <a:off x="6311468" y="3489283"/>
+            <a:ext cx="467629" cy="38105"/>
           </a:xfrm>
           <a:prstGeom prst="bentConnector3">
             <a:avLst>
-              <a:gd name="adj1" fmla="val -1124"/>
+              <a:gd name="adj1" fmla="val 102796"/>
             </a:avLst>
           </a:prstGeom>
           <a:ln w="19050">
@@ -7124,15 +7100,56 @@
           </a:fontRef>
         </p:style>
       </p:cxnSp>
-      <p:sp>
-        <p:nvSpPr>
-          <p:cNvPr id="121" name="Isosceles Triangle 102"/>
+      <p:cxnSp>
+        <p:nvCxnSpPr>
+          <p:cNvPr id="135" name="Elbow Connector 63"/>
+          <p:cNvCxnSpPr/>
+          <p:nvPr/>
+        </p:nvCxnSpPr>
+        <p:spPr>
+          <a:xfrm>
+            <a:off x="5046779" y="4122950"/>
+            <a:ext cx="707312" cy="991"/>
+          </a:xfrm>
+          <a:prstGeom prst="bentConnector3">
+            <a:avLst>
+              <a:gd name="adj1" fmla="val 50000"/>
+            </a:avLst>
+          </a:prstGeom>
+          <a:ln w="19050">
+            <a:solidFill>
+              <a:srgbClr val="7030A0"/>
+            </a:solidFill>
+            <a:prstDash val="sysDot"/>
+            <a:headEnd type="none" w="med" len="med"/>
+            <a:tailEnd type="none" w="med" len="med"/>
+          </a:ln>
+          <a:effectLst/>
+        </p:spPr>
+        <p:style>
+          <a:lnRef idx="1">
+            <a:schemeClr val="accent2"/>
+          </a:lnRef>
+          <a:fillRef idx="2">
+            <a:schemeClr val="accent2"/>
+          </a:fillRef>
+          <a:effectRef idx="1">
+            <a:schemeClr val="accent2"/>
+          </a:effectRef>
+          <a:fontRef idx="minor">
+            <a:schemeClr val="dk1"/>
+          </a:fontRef>
+        </p:style>
+      </p:cxnSp>
+      <p:sp>
+        <p:nvSpPr>
+          <p:cNvPr id="138" name="Isosceles Triangle 102"/>
           <p:cNvSpPr/>
           <p:nvPr/>
         </p:nvSpPr>
         <p:spPr>
-          <a:xfrm rot="16200000" flipV="1">
-            <a:off x="5735326" y="4033305"/>
+          <a:xfrm rot="5400000" flipV="1">
+            <a:off x="5146544" y="4772664"/>
             <a:ext cx="270504" cy="175523"/>
           </a:xfrm>
           <a:prstGeom prst="triangle">
@@ -7174,22 +7191,19 @@
       </p:sp>
       <p:cxnSp>
         <p:nvCxnSpPr>
-          <p:cNvPr id="131" name="Elbow Connector 63"/>
+          <p:cNvPr id="139" name="Elbow Connector 63"/>
           <p:cNvCxnSpPr>
-            <a:stCxn id="71" idx="3"/>
-            <a:endCxn id="89" idx="2"/>
+            <a:endCxn id="67" idx="3"/>
           </p:cNvCxnSpPr>
           <p:nvPr/>
         </p:nvCxnSpPr>
         <p:spPr>
           <a:xfrm rot="16200000" flipV="1">
-            <a:off x="6311468" y="3489283"/>
-            <a:ext cx="467629" cy="38105"/>
-          </a:xfrm>
-          <a:prstGeom prst="bentConnector3">
-            <a:avLst>
-              <a:gd name="adj1" fmla="val 102796"/>
-            </a:avLst>
+            <a:off x="3970840" y="3194414"/>
+            <a:ext cx="2678187" cy="610385"/>
+          </a:xfrm>
+          <a:prstGeom prst="bentConnector2">
+            <a:avLst/>
           </a:prstGeom>
           <a:ln w="19050">
             <a:solidFill>
@@ -7218,14 +7232,16 @@
       </p:cxnSp>
       <p:cxnSp>
         <p:nvCxnSpPr>
-          <p:cNvPr id="135" name="Elbow Connector 63"/>
-          <p:cNvCxnSpPr/>
+          <p:cNvPr id="82" name="Elbow Connector 63"/>
+          <p:cNvCxnSpPr>
+            <a:stCxn id="138" idx="3"/>
+          </p:cNvCxnSpPr>
           <p:nvPr/>
         </p:nvCxnSpPr>
         <p:spPr>
-          <a:xfrm>
-            <a:off x="5046779" y="4122950"/>
-            <a:ext cx="707312" cy="991"/>
+          <a:xfrm flipV="1">
+            <a:off x="5369558" y="4855695"/>
+            <a:ext cx="245570" cy="4731"/>
           </a:xfrm>
           <a:prstGeom prst="bentConnector3">
             <a:avLst>
@@ -7259,134 +7275,82 @@
       </p:cxnSp>
       <p:sp>
         <p:nvSpPr>
-          <p:cNvPr id="138" name="Isosceles Triangle 102"/>
-          <p:cNvSpPr/>
+          <p:cNvPr id="86" name="TextBox 85"/>
+          <p:cNvSpPr txBox="1"/>
           <p:nvPr/>
         </p:nvSpPr>
         <p:spPr>
-          <a:xfrm rot="5400000" flipV="1">
-            <a:off x="5143635" y="4753403"/>
-            <a:ext cx="270504" cy="175523"/>
-          </a:xfrm>
-          <a:prstGeom prst="triangle">
+          <a:xfrm>
+            <a:off x="4477370" y="4469516"/>
+            <a:ext cx="189257" cy="178683"/>
+          </a:xfrm>
+          <a:prstGeom prst="rect">
             <a:avLst/>
           </a:prstGeom>
-          <a:ln w="19050">
-            <a:solidFill>
-              <a:srgbClr val="7030A0"/>
-            </a:solidFill>
-          </a:ln>
-          <a:effectLst/>
-        </p:spPr>
-        <p:style>
-          <a:lnRef idx="1">
-            <a:schemeClr val="accent4"/>
-          </a:lnRef>
-          <a:fillRef idx="2">
-            <a:schemeClr val="accent4"/>
-          </a:fillRef>
-          <a:effectRef idx="1">
-            <a:schemeClr val="accent4"/>
-          </a:effectRef>
-          <a:fontRef idx="minor">
-            <a:schemeClr val="dk1"/>
-          </a:fontRef>
-        </p:style>
-        <p:txBody>
-          <a:bodyPr rtlCol="0" anchor="ctr"/>
+          <a:noFill/>
+        </p:spPr>
+        <p:txBody>
+          <a:bodyPr wrap="square" lIns="0" tIns="0" rIns="0" bIns="0" rtlCol="0">
+            <a:noAutofit/>
+          </a:bodyPr>
           <a:lstStyle/>
           <a:p>
             <a:pPr algn="ctr"/>
-            <a:endParaRPr lang="en-SG" sz="1050" b="1">
+            <a:r>
+              <a:rPr lang="en-US" sz="1100" dirty="0">
+                <a:solidFill>
+                  <a:srgbClr val="7030A0"/>
+                </a:solidFill>
+              </a:rPr>
+              <a:t>*</a:t>
+            </a:r>
+            <a:endParaRPr lang="en-SG" sz="1100" dirty="0">
               <a:solidFill>
-                <a:srgbClr val="92D050"/>
+                <a:srgbClr val="7030A0"/>
               </a:solidFill>
             </a:endParaRPr>
           </a:p>
         </p:txBody>
       </p:sp>
-      <p:cxnSp>
-        <p:nvCxnSpPr>
-          <p:cNvPr id="139" name="Elbow Connector 63"/>
-          <p:cNvCxnSpPr>
-            <a:endCxn id="67" idx="3"/>
-          </p:cNvCxnSpPr>
+      <p:sp>
+        <p:nvSpPr>
+          <p:cNvPr id="87" name="TextBox 86"/>
+          <p:cNvSpPr txBox="1"/>
           <p:nvPr/>
-        </p:nvCxnSpPr>
-        <p:spPr>
-          <a:xfrm rot="16200000" flipV="1">
-            <a:off x="3970840" y="3194414"/>
-            <a:ext cx="2678187" cy="610385"/>
-          </a:xfrm>
-          <a:prstGeom prst="bentConnector2">
+        </p:nvSpPr>
+        <p:spPr>
+          <a:xfrm>
+            <a:off x="4048883" y="4164717"/>
+            <a:ext cx="189257" cy="178683"/>
+          </a:xfrm>
+          <a:prstGeom prst="rect">
             <a:avLst/>
           </a:prstGeom>
-          <a:ln w="19050">
-            <a:solidFill>
-              <a:srgbClr val="7030A0"/>
-            </a:solidFill>
-            <a:prstDash val="sysDot"/>
-            <a:headEnd type="none" w="med" len="med"/>
-            <a:tailEnd type="none" w="med" len="med"/>
-          </a:ln>
-          <a:effectLst/>
-        </p:spPr>
-        <p:style>
-          <a:lnRef idx="1">
-            <a:schemeClr val="accent2"/>
-          </a:lnRef>
-          <a:fillRef idx="2">
-            <a:schemeClr val="accent2"/>
-          </a:fillRef>
-          <a:effectRef idx="1">
-            <a:schemeClr val="accent2"/>
-          </a:effectRef>
-          <a:fontRef idx="minor">
-            <a:schemeClr val="dk1"/>
-          </a:fontRef>
-        </p:style>
-      </p:cxnSp>
-      <p:cxnSp>
-        <p:nvCxnSpPr>
-          <p:cNvPr id="143" name="Elbow Connector 63"/>
-          <p:cNvCxnSpPr/>
-          <p:nvPr/>
-        </p:nvCxnSpPr>
-        <p:spPr>
-          <a:xfrm flipV="1">
-            <a:off x="5374906" y="4849421"/>
-            <a:ext cx="240220" cy="11004"/>
-          </a:xfrm>
-          <a:prstGeom prst="bentConnector3">
-            <a:avLst>
-              <a:gd name="adj1" fmla="val 50000"/>
-            </a:avLst>
-          </a:prstGeom>
-          <a:ln w="19050">
-            <a:solidFill>
-              <a:srgbClr val="7030A0"/>
-            </a:solidFill>
-            <a:prstDash val="sysDot"/>
-            <a:headEnd type="none" w="med" len="med"/>
-            <a:tailEnd type="none" w="med" len="med"/>
-          </a:ln>
-          <a:effectLst/>
-        </p:spPr>
-        <p:style>
-          <a:lnRef idx="1">
-            <a:schemeClr val="accent2"/>
-          </a:lnRef>
-          <a:fillRef idx="2">
-            <a:schemeClr val="accent2"/>
-          </a:fillRef>
-          <a:effectRef idx="1">
-            <a:schemeClr val="accent2"/>
-          </a:effectRef>
-          <a:fontRef idx="minor">
-            <a:schemeClr val="dk1"/>
-          </a:fontRef>
-        </p:style>
-      </p:cxnSp>
+          <a:noFill/>
+        </p:spPr>
+        <p:txBody>
+          <a:bodyPr wrap="square" lIns="0" tIns="0" rIns="0" bIns="0" rtlCol="0">
+            <a:noAutofit/>
+          </a:bodyPr>
+          <a:lstStyle/>
+          <a:p>
+            <a:pPr algn="ctr"/>
+            <a:r>
+              <a:rPr lang="en-US" sz="1100" dirty="0" smtClean="0">
+                <a:solidFill>
+                  <a:srgbClr val="7030A0"/>
+                </a:solidFill>
+              </a:rPr>
+              <a:t>*</a:t>
+            </a:r>
+            <a:endParaRPr lang="en-SG" sz="1100" dirty="0">
+              <a:solidFill>
+                <a:srgbClr val="7030A0"/>
+              </a:solidFill>
+            </a:endParaRPr>
+          </a:p>
+        </p:txBody>
+      </p:sp>
     </p:spTree>
     <p:extLst>
       <p:ext uri="{BB962C8B-B14F-4D97-AF65-F5344CB8AC3E}">

</xml_diff>

<commit_message>
[V0.5][Class Diagram] Update class diagram
</commit_message>
<xml_diff>
--- a/docs/diagrams/ModelComponentClassDiagram.pptx
+++ b/docs/diagrams/ModelComponentClassDiagram.pptx
@@ -3595,7 +3595,7 @@
           <a:p>
             <a:pPr algn="ctr"/>
             <a:r>
-              <a:rPr lang="en-US" sz="1050" dirty="0" err="1" smtClean="0">
+              <a:rPr lang="en-US" sz="1050" dirty="0" smtClean="0">
                 <a:solidFill>
                   <a:schemeClr val="bg1"/>
                 </a:solidFill>
@@ -3654,7 +3654,7 @@
           <a:p>
             <a:pPr algn="ctr"/>
             <a:r>
-              <a:rPr lang="en-US" sz="1050" dirty="0" err="1" smtClean="0">
+              <a:rPr lang="en-US" sz="1050" dirty="0" smtClean="0">
                 <a:solidFill>
                   <a:schemeClr val="bg1"/>
                 </a:solidFill>
@@ -3995,7 +3995,7 @@
           <a:p>
             <a:pPr algn="ctr"/>
             <a:r>
-              <a:rPr lang="en-US" altLang="zh-CN" sz="1050" dirty="0" err="1" smtClean="0">
+              <a:rPr lang="en-US" altLang="zh-CN" sz="1050" dirty="0" smtClean="0">
                 <a:solidFill>
                   <a:srgbClr val="7030A0"/>
                 </a:solidFill>
@@ -4136,7 +4136,7 @@
           <a:p>
             <a:pPr algn="ctr"/>
             <a:r>
-              <a:rPr lang="en-US" sz="1050" dirty="0" err="1" smtClean="0">
+              <a:rPr lang="en-US" sz="1050" dirty="0" smtClean="0">
                 <a:solidFill>
                   <a:srgbClr val="7030A0"/>
                 </a:solidFill>
@@ -4144,7 +4144,7 @@
               <a:t>Unique</a:t>
             </a:r>
             <a:r>
-              <a:rPr lang="en-US" altLang="zh-CN" sz="1050" dirty="0" err="1" smtClean="0">
+              <a:rPr lang="en-US" altLang="zh-CN" sz="1050" dirty="0" smtClean="0">
                 <a:solidFill>
                   <a:srgbClr val="7030A0"/>
                 </a:solidFill>
@@ -4152,7 +4152,7 @@
               <a:t>Task</a:t>
             </a:r>
             <a:r>
-              <a:rPr lang="en-US" sz="1050" dirty="0" err="1" smtClean="0">
+              <a:rPr lang="en-US" sz="1050" dirty="0" smtClean="0">
                 <a:solidFill>
                   <a:srgbClr val="7030A0"/>
                 </a:solidFill>
@@ -4255,7 +4255,7 @@
           <a:p>
             <a:pPr algn="ctr"/>
             <a:r>
-              <a:rPr lang="en-US" sz="1050" dirty="0" err="1" smtClean="0">
+              <a:rPr lang="en-US" sz="1050" dirty="0" smtClean="0">
                 <a:solidFill>
                   <a:srgbClr val="7030A0"/>
                 </a:solidFill>
@@ -4495,7 +4495,7 @@
           <a:p>
             <a:pPr algn="ctr"/>
             <a:r>
-              <a:rPr lang="en-US" altLang="zh-CN" sz="1050" dirty="0" err="1" smtClean="0">
+              <a:rPr lang="en-US" altLang="zh-CN" sz="1050" dirty="0" smtClean="0">
                 <a:solidFill>
                   <a:srgbClr val="7030A0"/>
                 </a:solidFill>
@@ -4767,7 +4767,7 @@
               </a:rPr>
             </a:br>
             <a:r>
-              <a:rPr lang="en-US" sz="1050" dirty="0" err="1" smtClean="0">
+              <a:rPr lang="en-US" sz="1050" dirty="0" smtClean="0">
                 <a:solidFill>
                   <a:srgbClr val="7030A0"/>
                 </a:solidFill>
@@ -4775,7 +4775,7 @@
               <a:t>ReadOnly</a:t>
             </a:r>
             <a:r>
-              <a:rPr lang="en-US" altLang="zh-CN" sz="1050" dirty="0" err="1" smtClean="0">
+              <a:rPr lang="en-US" altLang="zh-CN" sz="1050" dirty="0" smtClean="0">
                 <a:solidFill>
                   <a:srgbClr val="7030A0"/>
                 </a:solidFill>
@@ -4893,7 +4893,7 @@
               </a:rPr>
             </a:br>
             <a:r>
-              <a:rPr lang="en-US" sz="1050" dirty="0" err="1" smtClean="0">
+              <a:rPr lang="en-US" sz="1050" dirty="0" smtClean="0">
                 <a:solidFill>
                   <a:srgbClr val="7030A0"/>
                 </a:solidFill>
@@ -5372,7 +5372,7 @@
           <a:p>
             <a:pPr algn="ctr"/>
             <a:r>
-              <a:rPr lang="en-US" altLang="zh-CN" sz="1050" dirty="0" err="1" smtClean="0">
+              <a:rPr lang="en-US" altLang="zh-CN" sz="1050" dirty="0" smtClean="0">
                 <a:solidFill>
                   <a:srgbClr val="7030A0"/>
                 </a:solidFill>
@@ -6089,7 +6089,7 @@
               </a:rPr>
             </a:br>
             <a:r>
-              <a:rPr lang="en-US" sz="1050" dirty="0" err="1" smtClean="0">
+              <a:rPr lang="en-US" sz="1050" dirty="0" smtClean="0">
                 <a:solidFill>
                   <a:srgbClr val="7030A0"/>
                 </a:solidFill>
@@ -6097,7 +6097,7 @@
               <a:t>ReadOnly</a:t>
             </a:r>
             <a:r>
-              <a:rPr lang="en-US" altLang="zh-CN" sz="1050" dirty="0" err="1" smtClean="0">
+              <a:rPr lang="en-US" altLang="zh-CN" sz="1050" dirty="0" smtClean="0">
                 <a:solidFill>
                   <a:srgbClr val="7030A0"/>
                 </a:solidFill>
@@ -6168,20 +6168,12 @@
               </a:rPr>
             </a:br>
             <a:r>
-              <a:rPr lang="en-US" sz="1050" dirty="0" err="1" smtClean="0">
+              <a:rPr lang="en-US" sz="1050" dirty="0" smtClean="0">
                 <a:solidFill>
                   <a:srgbClr val="7030A0"/>
                 </a:solidFill>
               </a:rPr>
-              <a:t>ReadOnly</a:t>
-            </a:r>
-            <a:r>
-              <a:rPr lang="en-US" sz="1050" dirty="0" err="1" smtClean="0">
-                <a:solidFill>
-                  <a:srgbClr val="7030A0"/>
-                </a:solidFill>
-              </a:rPr>
-              <a:t>Task</a:t>
+              <a:t>ReadOnlyTask</a:t>
             </a:r>
             <a:endParaRPr lang="en-SG" sz="1050" dirty="0">
               <a:solidFill>
@@ -6239,23 +6231,15 @@
               </a:rPr>
               <a:t>&lt;&lt;interface&gt;&gt;</a:t>
             </a:r>
-            <a:r>
-              <a:rPr lang="en-US" sz="1050" smtClean="0">
-                <a:solidFill>
-                  <a:srgbClr val="7030A0"/>
-                </a:solidFill>
-              </a:rPr>
-              <a:t/>
-            </a:r>
             <a:br>
-              <a:rPr lang="en-US" sz="1050" smtClean="0">
+              <a:rPr lang="en-US" sz="1050" dirty="0" smtClean="0">
                 <a:solidFill>
                   <a:srgbClr val="7030A0"/>
                 </a:solidFill>
               </a:rPr>
             </a:br>
             <a:r>
-              <a:rPr lang="en-US" sz="1050" dirty="0" err="1" smtClean="0">
+              <a:rPr lang="en-US" sz="1050" dirty="0" smtClean="0">
                 <a:solidFill>
                   <a:srgbClr val="7030A0"/>
                 </a:solidFill>
@@ -6263,7 +6247,7 @@
               <a:t>ReadOnlyRecurring</a:t>
             </a:r>
             <a:r>
-              <a:rPr lang="en-US" altLang="zh-CN" sz="1050" dirty="0" err="1" smtClean="0">
+              <a:rPr lang="en-US" altLang="zh-CN" sz="1050" dirty="0" smtClean="0">
                 <a:solidFill>
                   <a:srgbClr val="7030A0"/>
                 </a:solidFill>
@@ -6334,20 +6318,12 @@
               </a:rPr>
             </a:br>
             <a:r>
-              <a:rPr lang="en-US" sz="1050" dirty="0" err="1" smtClean="0">
+              <a:rPr lang="en-US" sz="1050" dirty="0" smtClean="0">
                 <a:solidFill>
                   <a:srgbClr val="7030A0"/>
                 </a:solidFill>
               </a:rPr>
-              <a:t>ReadOnlyRecurring</a:t>
-            </a:r>
-            <a:r>
-              <a:rPr lang="en-US" sz="1050" dirty="0" err="1" smtClean="0">
-                <a:solidFill>
-                  <a:srgbClr val="7030A0"/>
-                </a:solidFill>
-              </a:rPr>
-              <a:t>Task</a:t>
+              <a:t>ReadOnlyRecurringTask</a:t>
             </a:r>
             <a:endParaRPr lang="en-SG" sz="1050" dirty="0">
               <a:solidFill>

</xml_diff>